<commit_message>
Update session 21 documents and add google-maps-lite.
</commit_message>
<xml_diff>
--- a/CPSC-24700/Presentations/session-21.pptx
+++ b/CPSC-24700/Presentations/session-21.pptx
@@ -5,7 +5,7 @@
     <p:sldMasterId id="2147483648" r:id="rId1"/>
   </p:sldMasterIdLst>
   <p:notesMasterIdLst>
-    <p:notesMasterId r:id="rId15"/>
+    <p:notesMasterId r:id="rId21"/>
   </p:notesMasterIdLst>
   <p:sldIdLst>
     <p:sldId id="257" r:id="rId2"/>
@@ -19,8 +19,14 @@
     <p:sldId id="311" r:id="rId10"/>
     <p:sldId id="301" r:id="rId11"/>
     <p:sldId id="300" r:id="rId12"/>
-    <p:sldId id="299" r:id="rId13"/>
-    <p:sldId id="263" r:id="rId14"/>
+    <p:sldId id="317" r:id="rId13"/>
+    <p:sldId id="318" r:id="rId14"/>
+    <p:sldId id="312" r:id="rId15"/>
+    <p:sldId id="313" r:id="rId16"/>
+    <p:sldId id="314" r:id="rId17"/>
+    <p:sldId id="315" r:id="rId18"/>
+    <p:sldId id="316" r:id="rId19"/>
+    <p:sldId id="263" r:id="rId20"/>
   </p:sldIdLst>
   <p:sldSz cx="12192000" cy="6858000"/>
   <p:notesSz cx="7315200" cy="9601200"/>
@@ -127,6 +133,10 @@
 </p:presentation>
 </file>
 
+<file path=ppt/revisionInfo.xml><?xml version="1.0" encoding="utf-8"?>
+<p1510:revInfo xmlns:a="http://schemas.openxmlformats.org/drawingml/2006/main" xmlns:r="http://schemas.openxmlformats.org/officeDocument/2006/relationships" xmlns:p1510="http://schemas.microsoft.com/office/powerpoint/2015/10/main"/>
+</file>
+
 <file path=ppt/notesMasters/notesMaster1.xml><?xml version="1.0" encoding="utf-8"?>
 <p:notesMaster xmlns:a="http://schemas.openxmlformats.org/drawingml/2006/main" xmlns:r="http://schemas.openxmlformats.org/officeDocument/2006/relationships" xmlns:p="http://schemas.openxmlformats.org/presentationml/2006/main">
   <p:cSld>
@@ -209,7 +219,7 @@
           <a:p>
             <a:fld id="{1CF91C02-A59E-4778-8D4F-4840DBBEFA68}" type="datetimeFigureOut">
               <a:rPr lang="en-US" smtClean="0"/>
-              <a:t>10/17/2017</a:t>
+              <a:t>10/18/2017</a:t>
             </a:fld>
             <a:endParaRPr lang="en-US"/>
           </a:p>
@@ -564,6 +574,513 @@
 </p:notes>
 </file>
 
+<file path=ppt/notesSlides/notesSlide10.xml><?xml version="1.0" encoding="utf-8"?>
+<p:notes xmlns:a="http://schemas.openxmlformats.org/drawingml/2006/main" xmlns:r="http://schemas.openxmlformats.org/officeDocument/2006/relationships" xmlns:p="http://schemas.openxmlformats.org/presentationml/2006/main">
+  <p:cSld>
+    <p:spTree>
+      <p:nvGrpSpPr>
+        <p:cNvPr id="1" name=""/>
+        <p:cNvGrpSpPr/>
+        <p:nvPr/>
+      </p:nvGrpSpPr>
+      <p:grpSpPr>
+        <a:xfrm>
+          <a:off x="0" y="0"/>
+          <a:ext cx="0" cy="0"/>
+          <a:chOff x="0" y="0"/>
+          <a:chExt cx="0" cy="0"/>
+        </a:xfrm>
+      </p:grpSpPr>
+      <p:sp>
+        <p:nvSpPr>
+          <p:cNvPr id="2" name="Slide Image Placeholder 1"/>
+          <p:cNvSpPr>
+            <a:spLocks noGrp="1" noRot="1" noChangeAspect="1"/>
+          </p:cNvSpPr>
+          <p:nvPr>
+            <p:ph type="sldImg"/>
+          </p:nvPr>
+        </p:nvSpPr>
+        <p:spPr/>
+      </p:sp>
+      <p:sp>
+        <p:nvSpPr>
+          <p:cNvPr id="3" name="Notes Placeholder 2"/>
+          <p:cNvSpPr>
+            <a:spLocks noGrp="1"/>
+          </p:cNvSpPr>
+          <p:nvPr>
+            <p:ph type="body" idx="1"/>
+          </p:nvPr>
+        </p:nvSpPr>
+        <p:spPr/>
+        <p:txBody>
+          <a:bodyPr/>
+          <a:lstStyle/>
+          <a:p>
+            <a:r>
+              <a:rPr lang="en-US" dirty="0"/>
+              <a:t>Creating ‘Hello World’ from ‘Yahtzee Dice Roller’ with external JavaScript and CSS files was the assignment for Monday last week. Let’s do it together to make sure that we are in the same place. </a:t>
+            </a:r>
+          </a:p>
+        </p:txBody>
+      </p:sp>
+      <p:sp>
+        <p:nvSpPr>
+          <p:cNvPr id="4" name="Slide Number Placeholder 3"/>
+          <p:cNvSpPr>
+            <a:spLocks noGrp="1"/>
+          </p:cNvSpPr>
+          <p:nvPr>
+            <p:ph type="sldNum" sz="quarter" idx="10"/>
+          </p:nvPr>
+        </p:nvSpPr>
+        <p:spPr/>
+        <p:txBody>
+          <a:bodyPr/>
+          <a:lstStyle/>
+          <a:p>
+            <a:fld id="{23B99BB9-C7F6-43B3-A122-46088ABB36FB}" type="slidenum">
+              <a:rPr lang="en-US" smtClean="0"/>
+              <a:t>14</a:t>
+            </a:fld>
+            <a:endParaRPr lang="en-US"/>
+          </a:p>
+        </p:txBody>
+      </p:sp>
+    </p:spTree>
+    <p:extLst>
+      <p:ext uri="{BB962C8B-B14F-4D97-AF65-F5344CB8AC3E}">
+        <p14:creationId xmlns:p14="http://schemas.microsoft.com/office/powerpoint/2010/main" val="1223204962"/>
+      </p:ext>
+    </p:extLst>
+  </p:cSld>
+  <p:clrMapOvr>
+    <a:masterClrMapping/>
+  </p:clrMapOvr>
+</p:notes>
+</file>
+
+<file path=ppt/notesSlides/notesSlide11.xml><?xml version="1.0" encoding="utf-8"?>
+<p:notes xmlns:a="http://schemas.openxmlformats.org/drawingml/2006/main" xmlns:r="http://schemas.openxmlformats.org/officeDocument/2006/relationships" xmlns:p="http://schemas.openxmlformats.org/presentationml/2006/main">
+  <p:cSld>
+    <p:spTree>
+      <p:nvGrpSpPr>
+        <p:cNvPr id="1" name=""/>
+        <p:cNvGrpSpPr/>
+        <p:nvPr/>
+      </p:nvGrpSpPr>
+      <p:grpSpPr>
+        <a:xfrm>
+          <a:off x="0" y="0"/>
+          <a:ext cx="0" cy="0"/>
+          <a:chOff x="0" y="0"/>
+          <a:chExt cx="0" cy="0"/>
+        </a:xfrm>
+      </p:grpSpPr>
+      <p:sp>
+        <p:nvSpPr>
+          <p:cNvPr id="2" name="Slide Image Placeholder 1"/>
+          <p:cNvSpPr>
+            <a:spLocks noGrp="1" noRot="1" noChangeAspect="1"/>
+          </p:cNvSpPr>
+          <p:nvPr>
+            <p:ph type="sldImg"/>
+          </p:nvPr>
+        </p:nvSpPr>
+        <p:spPr/>
+      </p:sp>
+      <p:sp>
+        <p:nvSpPr>
+          <p:cNvPr id="3" name="Notes Placeholder 2"/>
+          <p:cNvSpPr>
+            <a:spLocks noGrp="1"/>
+          </p:cNvSpPr>
+          <p:nvPr>
+            <p:ph type="body" idx="1"/>
+          </p:nvPr>
+        </p:nvSpPr>
+        <p:spPr/>
+        <p:txBody>
+          <a:bodyPr/>
+          <a:lstStyle/>
+          <a:p>
+            <a:endParaRPr lang="en-US" dirty="0"/>
+          </a:p>
+        </p:txBody>
+      </p:sp>
+      <p:sp>
+        <p:nvSpPr>
+          <p:cNvPr id="4" name="Slide Number Placeholder 3"/>
+          <p:cNvSpPr>
+            <a:spLocks noGrp="1"/>
+          </p:cNvSpPr>
+          <p:nvPr>
+            <p:ph type="sldNum" sz="quarter" idx="10"/>
+          </p:nvPr>
+        </p:nvSpPr>
+        <p:spPr/>
+        <p:txBody>
+          <a:bodyPr/>
+          <a:lstStyle/>
+          <a:p>
+            <a:fld id="{23B99BB9-C7F6-43B3-A122-46088ABB36FB}" type="slidenum">
+              <a:rPr lang="en-US" smtClean="0"/>
+              <a:t>15</a:t>
+            </a:fld>
+            <a:endParaRPr lang="en-US"/>
+          </a:p>
+        </p:txBody>
+      </p:sp>
+    </p:spTree>
+    <p:extLst>
+      <p:ext uri="{BB962C8B-B14F-4D97-AF65-F5344CB8AC3E}">
+        <p14:creationId xmlns:p14="http://schemas.microsoft.com/office/powerpoint/2010/main" val="1625802623"/>
+      </p:ext>
+    </p:extLst>
+  </p:cSld>
+  <p:clrMapOvr>
+    <a:masterClrMapping/>
+  </p:clrMapOvr>
+</p:notes>
+</file>
+
+<file path=ppt/notesSlides/notesSlide12.xml><?xml version="1.0" encoding="utf-8"?>
+<p:notes xmlns:a="http://schemas.openxmlformats.org/drawingml/2006/main" xmlns:r="http://schemas.openxmlformats.org/officeDocument/2006/relationships" xmlns:p="http://schemas.openxmlformats.org/presentationml/2006/main">
+  <p:cSld>
+    <p:spTree>
+      <p:nvGrpSpPr>
+        <p:cNvPr id="1" name=""/>
+        <p:cNvGrpSpPr/>
+        <p:nvPr/>
+      </p:nvGrpSpPr>
+      <p:grpSpPr>
+        <a:xfrm>
+          <a:off x="0" y="0"/>
+          <a:ext cx="0" cy="0"/>
+          <a:chOff x="0" y="0"/>
+          <a:chExt cx="0" cy="0"/>
+        </a:xfrm>
+      </p:grpSpPr>
+      <p:sp>
+        <p:nvSpPr>
+          <p:cNvPr id="2" name="Slide Image Placeholder 1"/>
+          <p:cNvSpPr>
+            <a:spLocks noGrp="1" noRot="1" noChangeAspect="1"/>
+          </p:cNvSpPr>
+          <p:nvPr>
+            <p:ph type="sldImg"/>
+          </p:nvPr>
+        </p:nvSpPr>
+        <p:spPr/>
+      </p:sp>
+      <p:sp>
+        <p:nvSpPr>
+          <p:cNvPr id="3" name="Notes Placeholder 2"/>
+          <p:cNvSpPr>
+            <a:spLocks noGrp="1"/>
+          </p:cNvSpPr>
+          <p:nvPr>
+            <p:ph type="body" idx="1"/>
+          </p:nvPr>
+        </p:nvSpPr>
+        <p:spPr/>
+        <p:txBody>
+          <a:bodyPr/>
+          <a:lstStyle/>
+          <a:p>
+            <a:endParaRPr lang="en-US" dirty="0"/>
+          </a:p>
+        </p:txBody>
+      </p:sp>
+      <p:sp>
+        <p:nvSpPr>
+          <p:cNvPr id="4" name="Slide Number Placeholder 3"/>
+          <p:cNvSpPr>
+            <a:spLocks noGrp="1"/>
+          </p:cNvSpPr>
+          <p:nvPr>
+            <p:ph type="sldNum" sz="quarter" idx="10"/>
+          </p:nvPr>
+        </p:nvSpPr>
+        <p:spPr/>
+        <p:txBody>
+          <a:bodyPr/>
+          <a:lstStyle/>
+          <a:p>
+            <a:fld id="{23B99BB9-C7F6-43B3-A122-46088ABB36FB}" type="slidenum">
+              <a:rPr lang="en-US" smtClean="0"/>
+              <a:t>16</a:t>
+            </a:fld>
+            <a:endParaRPr lang="en-US"/>
+          </a:p>
+        </p:txBody>
+      </p:sp>
+    </p:spTree>
+    <p:extLst>
+      <p:ext uri="{BB962C8B-B14F-4D97-AF65-F5344CB8AC3E}">
+        <p14:creationId xmlns:p14="http://schemas.microsoft.com/office/powerpoint/2010/main" val="2828765227"/>
+      </p:ext>
+    </p:extLst>
+  </p:cSld>
+  <p:clrMapOvr>
+    <a:masterClrMapping/>
+  </p:clrMapOvr>
+</p:notes>
+</file>
+
+<file path=ppt/notesSlides/notesSlide13.xml><?xml version="1.0" encoding="utf-8"?>
+<p:notes xmlns:a="http://schemas.openxmlformats.org/drawingml/2006/main" xmlns:r="http://schemas.openxmlformats.org/officeDocument/2006/relationships" xmlns:p="http://schemas.openxmlformats.org/presentationml/2006/main">
+  <p:cSld>
+    <p:spTree>
+      <p:nvGrpSpPr>
+        <p:cNvPr id="1" name=""/>
+        <p:cNvGrpSpPr/>
+        <p:nvPr/>
+      </p:nvGrpSpPr>
+      <p:grpSpPr>
+        <a:xfrm>
+          <a:off x="0" y="0"/>
+          <a:ext cx="0" cy="0"/>
+          <a:chOff x="0" y="0"/>
+          <a:chExt cx="0" cy="0"/>
+        </a:xfrm>
+      </p:grpSpPr>
+      <p:sp>
+        <p:nvSpPr>
+          <p:cNvPr id="2" name="Slide Image Placeholder 1"/>
+          <p:cNvSpPr>
+            <a:spLocks noGrp="1" noRot="1" noChangeAspect="1"/>
+          </p:cNvSpPr>
+          <p:nvPr>
+            <p:ph type="sldImg"/>
+          </p:nvPr>
+        </p:nvSpPr>
+        <p:spPr/>
+      </p:sp>
+      <p:sp>
+        <p:nvSpPr>
+          <p:cNvPr id="3" name="Notes Placeholder 2"/>
+          <p:cNvSpPr>
+            <a:spLocks noGrp="1"/>
+          </p:cNvSpPr>
+          <p:nvPr>
+            <p:ph type="body" idx="1"/>
+          </p:nvPr>
+        </p:nvSpPr>
+        <p:spPr/>
+        <p:txBody>
+          <a:bodyPr/>
+          <a:lstStyle/>
+          <a:p>
+            <a:endParaRPr lang="en-US" dirty="0"/>
+          </a:p>
+        </p:txBody>
+      </p:sp>
+      <p:sp>
+        <p:nvSpPr>
+          <p:cNvPr id="4" name="Slide Number Placeholder 3"/>
+          <p:cNvSpPr>
+            <a:spLocks noGrp="1"/>
+          </p:cNvSpPr>
+          <p:nvPr>
+            <p:ph type="sldNum" sz="quarter" idx="10"/>
+          </p:nvPr>
+        </p:nvSpPr>
+        <p:spPr/>
+        <p:txBody>
+          <a:bodyPr/>
+          <a:lstStyle/>
+          <a:p>
+            <a:fld id="{23B99BB9-C7F6-43B3-A122-46088ABB36FB}" type="slidenum">
+              <a:rPr lang="en-US" smtClean="0"/>
+              <a:t>17</a:t>
+            </a:fld>
+            <a:endParaRPr lang="en-US"/>
+          </a:p>
+        </p:txBody>
+      </p:sp>
+    </p:spTree>
+    <p:extLst>
+      <p:ext uri="{BB962C8B-B14F-4D97-AF65-F5344CB8AC3E}">
+        <p14:creationId xmlns:p14="http://schemas.microsoft.com/office/powerpoint/2010/main" val="3321655879"/>
+      </p:ext>
+    </p:extLst>
+  </p:cSld>
+  <p:clrMapOvr>
+    <a:masterClrMapping/>
+  </p:clrMapOvr>
+</p:notes>
+</file>
+
+<file path=ppt/notesSlides/notesSlide14.xml><?xml version="1.0" encoding="utf-8"?>
+<p:notes xmlns:a="http://schemas.openxmlformats.org/drawingml/2006/main" xmlns:r="http://schemas.openxmlformats.org/officeDocument/2006/relationships" xmlns:p="http://schemas.openxmlformats.org/presentationml/2006/main">
+  <p:cSld>
+    <p:spTree>
+      <p:nvGrpSpPr>
+        <p:cNvPr id="1" name=""/>
+        <p:cNvGrpSpPr/>
+        <p:nvPr/>
+      </p:nvGrpSpPr>
+      <p:grpSpPr>
+        <a:xfrm>
+          <a:off x="0" y="0"/>
+          <a:ext cx="0" cy="0"/>
+          <a:chOff x="0" y="0"/>
+          <a:chExt cx="0" cy="0"/>
+        </a:xfrm>
+      </p:grpSpPr>
+      <p:sp>
+        <p:nvSpPr>
+          <p:cNvPr id="2" name="Slide Image Placeholder 1"/>
+          <p:cNvSpPr>
+            <a:spLocks noGrp="1" noRot="1" noChangeAspect="1"/>
+          </p:cNvSpPr>
+          <p:nvPr>
+            <p:ph type="sldImg"/>
+          </p:nvPr>
+        </p:nvSpPr>
+        <p:spPr/>
+      </p:sp>
+      <p:sp>
+        <p:nvSpPr>
+          <p:cNvPr id="3" name="Notes Placeholder 2"/>
+          <p:cNvSpPr>
+            <a:spLocks noGrp="1"/>
+          </p:cNvSpPr>
+          <p:nvPr>
+            <p:ph type="body" idx="1"/>
+          </p:nvPr>
+        </p:nvSpPr>
+        <p:spPr/>
+        <p:txBody>
+          <a:bodyPr/>
+          <a:lstStyle/>
+          <a:p>
+            <a:endParaRPr lang="en-US" dirty="0"/>
+          </a:p>
+        </p:txBody>
+      </p:sp>
+      <p:sp>
+        <p:nvSpPr>
+          <p:cNvPr id="4" name="Slide Number Placeholder 3"/>
+          <p:cNvSpPr>
+            <a:spLocks noGrp="1"/>
+          </p:cNvSpPr>
+          <p:nvPr>
+            <p:ph type="sldNum" sz="quarter" idx="10"/>
+          </p:nvPr>
+        </p:nvSpPr>
+        <p:spPr/>
+        <p:txBody>
+          <a:bodyPr/>
+          <a:lstStyle/>
+          <a:p>
+            <a:fld id="{23B99BB9-C7F6-43B3-A122-46088ABB36FB}" type="slidenum">
+              <a:rPr lang="en-US" smtClean="0"/>
+              <a:t>18</a:t>
+            </a:fld>
+            <a:endParaRPr lang="en-US"/>
+          </a:p>
+        </p:txBody>
+      </p:sp>
+    </p:spTree>
+    <p:extLst>
+      <p:ext uri="{BB962C8B-B14F-4D97-AF65-F5344CB8AC3E}">
+        <p14:creationId xmlns:p14="http://schemas.microsoft.com/office/powerpoint/2010/main" val="2300074426"/>
+      </p:ext>
+    </p:extLst>
+  </p:cSld>
+  <p:clrMapOvr>
+    <a:masterClrMapping/>
+  </p:clrMapOvr>
+</p:notes>
+</file>
+
+<file path=ppt/notesSlides/notesSlide15.xml><?xml version="1.0" encoding="utf-8"?>
+<p:notes xmlns:a="http://schemas.openxmlformats.org/drawingml/2006/main" xmlns:r="http://schemas.openxmlformats.org/officeDocument/2006/relationships" xmlns:p="http://schemas.openxmlformats.org/presentationml/2006/main">
+  <p:cSld>
+    <p:spTree>
+      <p:nvGrpSpPr>
+        <p:cNvPr id="1" name=""/>
+        <p:cNvGrpSpPr/>
+        <p:nvPr/>
+      </p:nvGrpSpPr>
+      <p:grpSpPr>
+        <a:xfrm>
+          <a:off x="0" y="0"/>
+          <a:ext cx="0" cy="0"/>
+          <a:chOff x="0" y="0"/>
+          <a:chExt cx="0" cy="0"/>
+        </a:xfrm>
+      </p:grpSpPr>
+      <p:sp>
+        <p:nvSpPr>
+          <p:cNvPr id="2" name="Slide Image Placeholder 1"/>
+          <p:cNvSpPr>
+            <a:spLocks noGrp="1" noRot="1" noChangeAspect="1"/>
+          </p:cNvSpPr>
+          <p:nvPr>
+            <p:ph type="sldImg"/>
+          </p:nvPr>
+        </p:nvSpPr>
+        <p:spPr/>
+      </p:sp>
+      <p:sp>
+        <p:nvSpPr>
+          <p:cNvPr id="3" name="Notes Placeholder 2"/>
+          <p:cNvSpPr>
+            <a:spLocks noGrp="1"/>
+          </p:cNvSpPr>
+          <p:nvPr>
+            <p:ph type="body" idx="1"/>
+          </p:nvPr>
+        </p:nvSpPr>
+        <p:spPr/>
+        <p:txBody>
+          <a:bodyPr/>
+          <a:lstStyle/>
+          <a:p>
+            <a:endParaRPr lang="en-US" dirty="0"/>
+          </a:p>
+        </p:txBody>
+      </p:sp>
+      <p:sp>
+        <p:nvSpPr>
+          <p:cNvPr id="4" name="Slide Number Placeholder 3"/>
+          <p:cNvSpPr>
+            <a:spLocks noGrp="1"/>
+          </p:cNvSpPr>
+          <p:nvPr>
+            <p:ph type="sldNum" sz="quarter" idx="10"/>
+          </p:nvPr>
+        </p:nvSpPr>
+        <p:spPr/>
+        <p:txBody>
+          <a:bodyPr/>
+          <a:lstStyle/>
+          <a:p>
+            <a:fld id="{5394DE12-7B9B-46AA-AC19-C30A49928B9B}" type="slidenum">
+              <a:rPr lang="en-US" smtClean="0"/>
+              <a:t>19</a:t>
+            </a:fld>
+            <a:endParaRPr lang="en-US" dirty="0"/>
+          </a:p>
+        </p:txBody>
+      </p:sp>
+    </p:spTree>
+    <p:extLst>
+      <p:ext uri="{BB962C8B-B14F-4D97-AF65-F5344CB8AC3E}">
+        <p14:creationId xmlns:p14="http://schemas.microsoft.com/office/powerpoint/2010/main" val="3850776935"/>
+      </p:ext>
+    </p:extLst>
+  </p:cSld>
+  <p:clrMapOvr>
+    <a:masterClrMapping/>
+  </p:clrMapOvr>
+</p:notes>
+</file>
+
 <file path=ppt/notesSlides/notesSlide2.xml><?xml version="1.0" encoding="utf-8"?>
 <p:notes xmlns:a="http://schemas.openxmlformats.org/drawingml/2006/main" xmlns:r="http://schemas.openxmlformats.org/officeDocument/2006/relationships" xmlns:p="http://schemas.openxmlformats.org/presentationml/2006/main">
   <p:cSld>
@@ -1149,13 +1666,8 @@
           <a:p>
             <a:r>
               <a:rPr lang="en-US" dirty="0"/>
-              <a:t>I have made the solution to our Week 3 lab available. My strong suggestion is to do you best on your own and using “normal” resources available to you (Web, classmates, etc.) and then use the solution as a last resort</a:t>
-            </a:r>
-            <a:r>
-              <a:rPr lang="en-US"/>
-              <a:t>. </a:t>
-            </a:r>
-            <a:endParaRPr lang="en-US" dirty="0"/>
+              <a:t>This is from the syllabus. </a:t>
+            </a:r>
           </a:p>
         </p:txBody>
       </p:sp>
@@ -1174,18 +1686,18 @@
           <a:bodyPr/>
           <a:lstStyle/>
           <a:p>
-            <a:fld id="{5394DE12-7B9B-46AA-AC19-C30A49928B9B}" type="slidenum">
+            <a:fld id="{23B99BB9-C7F6-43B3-A122-46088ABB36FB}" type="slidenum">
               <a:rPr lang="en-US" smtClean="0"/>
               <a:t>12</a:t>
             </a:fld>
-            <a:endParaRPr lang="en-US" dirty="0"/>
+            <a:endParaRPr lang="en-US"/>
           </a:p>
         </p:txBody>
       </p:sp>
     </p:spTree>
     <p:extLst>
       <p:ext uri="{BB962C8B-B14F-4D97-AF65-F5344CB8AC3E}">
-        <p14:creationId xmlns:p14="http://schemas.microsoft.com/office/powerpoint/2010/main" val="2032946705"/>
+        <p14:creationId xmlns:p14="http://schemas.microsoft.com/office/powerpoint/2010/main" val="2304747524"/>
       </p:ext>
     </p:extLst>
   </p:cSld>
@@ -1258,18 +1770,18 @@
           <a:bodyPr/>
           <a:lstStyle/>
           <a:p>
-            <a:fld id="{5394DE12-7B9B-46AA-AC19-C30A49928B9B}" type="slidenum">
+            <a:fld id="{23B99BB9-C7F6-43B3-A122-46088ABB36FB}" type="slidenum">
               <a:rPr lang="en-US" smtClean="0"/>
               <a:t>13</a:t>
             </a:fld>
-            <a:endParaRPr lang="en-US" dirty="0"/>
+            <a:endParaRPr lang="en-US"/>
           </a:p>
         </p:txBody>
       </p:sp>
     </p:spTree>
     <p:extLst>
       <p:ext uri="{BB962C8B-B14F-4D97-AF65-F5344CB8AC3E}">
-        <p14:creationId xmlns:p14="http://schemas.microsoft.com/office/powerpoint/2010/main" val="3850776935"/>
+        <p14:creationId xmlns:p14="http://schemas.microsoft.com/office/powerpoint/2010/main" val="1826705078"/>
       </p:ext>
     </p:extLst>
   </p:cSld>
@@ -1426,7 +1938,7 @@
           <a:p>
             <a:fld id="{5FB62F81-FD80-4AA8-93CA-E835B40BE667}" type="datetimeFigureOut">
               <a:rPr lang="en-US" smtClean="0"/>
-              <a:t>10/17/2017</a:t>
+              <a:t>10/18/2017</a:t>
             </a:fld>
             <a:endParaRPr lang="en-US"/>
           </a:p>
@@ -1624,7 +2136,7 @@
           <a:p>
             <a:fld id="{5FB62F81-FD80-4AA8-93CA-E835B40BE667}" type="datetimeFigureOut">
               <a:rPr lang="en-US" smtClean="0"/>
-              <a:t>10/17/2017</a:t>
+              <a:t>10/18/2017</a:t>
             </a:fld>
             <a:endParaRPr lang="en-US"/>
           </a:p>
@@ -1832,7 +2344,7 @@
           <a:p>
             <a:fld id="{5FB62F81-FD80-4AA8-93CA-E835B40BE667}" type="datetimeFigureOut">
               <a:rPr lang="en-US" smtClean="0"/>
-              <a:t>10/17/2017</a:t>
+              <a:t>10/18/2017</a:t>
             </a:fld>
             <a:endParaRPr lang="en-US"/>
           </a:p>
@@ -2030,7 +2542,7 @@
           <a:p>
             <a:fld id="{5FB62F81-FD80-4AA8-93CA-E835B40BE667}" type="datetimeFigureOut">
               <a:rPr lang="en-US" smtClean="0"/>
-              <a:t>10/17/2017</a:t>
+              <a:t>10/18/2017</a:t>
             </a:fld>
             <a:endParaRPr lang="en-US"/>
           </a:p>
@@ -2305,7 +2817,7 @@
           <a:p>
             <a:fld id="{5FB62F81-FD80-4AA8-93CA-E835B40BE667}" type="datetimeFigureOut">
               <a:rPr lang="en-US" smtClean="0"/>
-              <a:t>10/17/2017</a:t>
+              <a:t>10/18/2017</a:t>
             </a:fld>
             <a:endParaRPr lang="en-US"/>
           </a:p>
@@ -2570,7 +3082,7 @@
           <a:p>
             <a:fld id="{5FB62F81-FD80-4AA8-93CA-E835B40BE667}" type="datetimeFigureOut">
               <a:rPr lang="en-US" smtClean="0"/>
-              <a:t>10/17/2017</a:t>
+              <a:t>10/18/2017</a:t>
             </a:fld>
             <a:endParaRPr lang="en-US"/>
           </a:p>
@@ -2982,7 +3494,7 @@
           <a:p>
             <a:fld id="{5FB62F81-FD80-4AA8-93CA-E835B40BE667}" type="datetimeFigureOut">
               <a:rPr lang="en-US" smtClean="0"/>
-              <a:t>10/17/2017</a:t>
+              <a:t>10/18/2017</a:t>
             </a:fld>
             <a:endParaRPr lang="en-US"/>
           </a:p>
@@ -3123,7 +3635,7 @@
           <a:p>
             <a:fld id="{5FB62F81-FD80-4AA8-93CA-E835B40BE667}" type="datetimeFigureOut">
               <a:rPr lang="en-US" smtClean="0"/>
-              <a:t>10/17/2017</a:t>
+              <a:t>10/18/2017</a:t>
             </a:fld>
             <a:endParaRPr lang="en-US"/>
           </a:p>
@@ -3236,7 +3748,7 @@
           <a:p>
             <a:fld id="{5FB62F81-FD80-4AA8-93CA-E835B40BE667}" type="datetimeFigureOut">
               <a:rPr lang="en-US" smtClean="0"/>
-              <a:t>10/17/2017</a:t>
+              <a:t>10/18/2017</a:t>
             </a:fld>
             <a:endParaRPr lang="en-US"/>
           </a:p>
@@ -3547,7 +4059,7 @@
           <a:p>
             <a:fld id="{5FB62F81-FD80-4AA8-93CA-E835B40BE667}" type="datetimeFigureOut">
               <a:rPr lang="en-US" smtClean="0"/>
-              <a:t>10/17/2017</a:t>
+              <a:t>10/18/2017</a:t>
             </a:fld>
             <a:endParaRPr lang="en-US"/>
           </a:p>
@@ -3835,7 +4347,7 @@
           <a:p>
             <a:fld id="{5FB62F81-FD80-4AA8-93CA-E835B40BE667}" type="datetimeFigureOut">
               <a:rPr lang="en-US" smtClean="0"/>
-              <a:t>10/17/2017</a:t>
+              <a:t>10/18/2017</a:t>
             </a:fld>
             <a:endParaRPr lang="en-US"/>
           </a:p>
@@ -4076,7 +4588,7 @@
           <a:p>
             <a:fld id="{5FB62F81-FD80-4AA8-93CA-E835B40BE667}" type="datetimeFigureOut">
               <a:rPr lang="en-US" smtClean="0"/>
-              <a:t>10/17/2017</a:t>
+              <a:t>10/18/2017</a:t>
             </a:fld>
             <a:endParaRPr lang="en-US"/>
           </a:p>
@@ -4610,7 +5122,7 @@
             </a:pPr>
             <a:r>
               <a:rPr lang="en-US" sz="2000" dirty="0"/>
-              <a:t>Google Maps Coding Session… Week 7 Lab &amp; Project 3: Google Maps!</a:t>
+              <a:t>Google Maps Live Coding Session… TOGETHER!</a:t>
             </a:r>
           </a:p>
           <a:p>
@@ -4857,7 +5369,7 @@
           <a:p>
             <a:r>
               <a:rPr lang="en-US" sz="4800" dirty="0"/>
-              <a:t>Live Coding Tutorial</a:t>
+              <a:t>Live Coding Session*</a:t>
             </a:r>
             <a:br>
               <a:rPr lang="en-US" sz="4800" dirty="0"/>
@@ -4901,18 +5413,24 @@
       </p:grpSpPr>
       <p:sp>
         <p:nvSpPr>
-          <p:cNvPr id="2" name="Title 1"/>
-          <p:cNvSpPr>
-            <a:spLocks noGrp="1"/>
-          </p:cNvSpPr>
-          <p:nvPr>
-            <p:ph type="ctrTitle"/>
+          <p:cNvPr id="4" name="Title 1">
+            <a:extLst>
+              <a:ext uri="{FF2B5EF4-FFF2-40B4-BE49-F238E27FC236}">
+                <a16:creationId xmlns:a16="http://schemas.microsoft.com/office/drawing/2014/main" id="{527CE47F-3EF6-48CA-9239-E8B6E5C6B41A}"/>
+              </a:ext>
+            </a:extLst>
+          </p:cNvPr>
+          <p:cNvSpPr>
+            <a:spLocks noGrp="1"/>
+          </p:cNvSpPr>
+          <p:nvPr>
+            <p:ph type="title"/>
           </p:nvPr>
         </p:nvSpPr>
         <p:spPr>
           <a:xfrm>
-            <a:off x="1524000" y="1122363"/>
-            <a:ext cx="9144000" cy="3200256"/>
+            <a:off x="838200" y="365125"/>
+            <a:ext cx="10515600" cy="1325563"/>
           </a:xfrm>
         </p:spPr>
         <p:txBody>
@@ -4921,27 +5439,1253 @@
           </a:bodyPr>
           <a:lstStyle/>
           <a:p>
-            <a:br>
-              <a:rPr lang="en-US" sz="4800" dirty="0"/>
-            </a:br>
-            <a:r>
-              <a:rPr lang="en-US" sz="4800" dirty="0"/>
-              <a:t>Week 8 Lab &amp; Project 3: </a:t>
-            </a:r>
-            <a:br>
-              <a:rPr lang="en-US" sz="4800" dirty="0"/>
-            </a:br>
-            <a:r>
-              <a:rPr lang="en-US" sz="4800" dirty="0"/>
-              <a:t>Google Maps!</a:t>
-            </a:r>
+            <a:r>
+              <a:rPr lang="en-US" sz="3600" dirty="0"/>
+              <a:t>How to Completing your Projects this semester</a:t>
+            </a:r>
+          </a:p>
+        </p:txBody>
+      </p:sp>
+      <p:sp>
+        <p:nvSpPr>
+          <p:cNvPr id="5" name="Content Placeholder 2">
+            <a:extLst>
+              <a:ext uri="{FF2B5EF4-FFF2-40B4-BE49-F238E27FC236}">
+                <a16:creationId xmlns:a16="http://schemas.microsoft.com/office/drawing/2014/main" id="{E8F0EA9A-219C-40FD-AE36-784EE1B77D56}"/>
+              </a:ext>
+            </a:extLst>
+          </p:cNvPr>
+          <p:cNvSpPr>
+            <a:spLocks noGrp="1"/>
+          </p:cNvSpPr>
+          <p:nvPr>
+            <p:ph idx="1"/>
+          </p:nvPr>
+        </p:nvSpPr>
+        <p:spPr>
+          <a:xfrm>
+            <a:off x="838198" y="1525772"/>
+            <a:ext cx="10515601" cy="4547409"/>
+          </a:xfrm>
+        </p:spPr>
+        <p:txBody>
+          <a:bodyPr>
+            <a:normAutofit/>
+          </a:bodyPr>
+          <a:lstStyle/>
+          <a:p>
+            <a:pPr marL="457200" indent="-457200">
+              <a:buFont typeface="+mj-lt"/>
+              <a:buAutoNum type="arabicPeriod"/>
+            </a:pPr>
+            <a:r>
+              <a:rPr lang="en-US" sz="2000" dirty="0"/>
+              <a:t>Start early on project assignments</a:t>
+            </a:r>
+          </a:p>
+          <a:p>
+            <a:pPr marL="457200" indent="-457200">
+              <a:buFont typeface="+mj-lt"/>
+              <a:buAutoNum type="arabicPeriod"/>
+            </a:pPr>
+            <a:r>
+              <a:rPr lang="en-US" sz="2000" dirty="0"/>
+              <a:t>Establish a physical work environment that allows you to focus for extended periods of time</a:t>
+            </a:r>
+          </a:p>
+          <a:p>
+            <a:pPr marL="457200" indent="-457200">
+              <a:buFont typeface="+mj-lt"/>
+              <a:buAutoNum type="arabicPeriod"/>
+            </a:pPr>
+            <a:r>
+              <a:rPr lang="en-US" sz="2000" dirty="0"/>
+              <a:t>Become comfortable with your development environment/tools</a:t>
+            </a:r>
+          </a:p>
+          <a:p>
+            <a:pPr marL="457200" indent="-457200">
+              <a:buFont typeface="+mj-lt"/>
+              <a:buAutoNum type="arabicPeriod"/>
+            </a:pPr>
+            <a:r>
+              <a:rPr lang="en-US" sz="2000" dirty="0"/>
+              <a:t>Read or re-read the project assignment and related materials</a:t>
+            </a:r>
+          </a:p>
+          <a:p>
+            <a:pPr marL="457200" indent="-457200">
+              <a:buFont typeface="+mj-lt"/>
+              <a:buAutoNum type="arabicPeriod"/>
+            </a:pPr>
+            <a:r>
+              <a:rPr lang="en-US" sz="2000" dirty="0"/>
+              <a:t>Suggest changes to the assignment if you feel you have found a better way</a:t>
+            </a:r>
+          </a:p>
+          <a:p>
+            <a:pPr marL="457200" indent="-457200">
+              <a:buFont typeface="+mj-lt"/>
+              <a:buAutoNum type="arabicPeriod"/>
+            </a:pPr>
+            <a:r>
+              <a:rPr lang="en-US" sz="2000" dirty="0"/>
+              <a:t>Save and deploy working versions of your project regularly… this allows you to experiment without risking what you have already accomplished</a:t>
+            </a:r>
+          </a:p>
+          <a:p>
+            <a:pPr marL="457200" indent="-457200">
+              <a:buFont typeface="+mj-lt"/>
+              <a:buAutoNum type="arabicPeriod"/>
+            </a:pPr>
+            <a:r>
+              <a:rPr lang="en-US" sz="2000" dirty="0"/>
+              <a:t>Ask for help if you are stuck… often simply articulating the problem/question will lead you to finding your own answer</a:t>
+            </a:r>
+          </a:p>
+          <a:p>
+            <a:pPr marL="457200" indent="-457200">
+              <a:buFont typeface="+mj-lt"/>
+              <a:buAutoNum type="arabicPeriod"/>
+            </a:pPr>
+            <a:r>
+              <a:rPr lang="en-US" sz="2000" dirty="0"/>
+              <a:t>Look for similar examples… but write your own code that you understand</a:t>
+            </a:r>
+          </a:p>
+          <a:p>
+            <a:pPr marL="457200" indent="-457200">
+              <a:buFont typeface="+mj-lt"/>
+              <a:buAutoNum type="arabicPeriod"/>
+            </a:pPr>
+            <a:r>
+              <a:rPr lang="en-US" sz="2000" dirty="0"/>
+              <a:t>Come to class and participate in class exercises… ask questions during or after class</a:t>
+            </a:r>
+          </a:p>
+          <a:p>
+            <a:pPr marL="457200" indent="-457200">
+              <a:buFont typeface="+mj-lt"/>
+              <a:buAutoNum type="arabicPeriod"/>
+            </a:pPr>
+            <a:r>
+              <a:rPr lang="en-US" sz="2000" dirty="0"/>
+              <a:t>Review the textbook and review the lecture slides</a:t>
+            </a:r>
+          </a:p>
+        </p:txBody>
+      </p:sp>
+      <p:pic>
+        <p:nvPicPr>
+          <p:cNvPr id="2050" name="Picture 1" descr="Incorrect">
+            <a:extLst>
+              <a:ext uri="{FF2B5EF4-FFF2-40B4-BE49-F238E27FC236}">
+                <a16:creationId xmlns:a16="http://schemas.microsoft.com/office/drawing/2014/main" id="{FF58184F-9DBB-46F2-9AD1-5DD64E112630}"/>
+              </a:ext>
+            </a:extLst>
+          </p:cNvPr>
+          <p:cNvPicPr>
+            <a:picLocks noChangeAspect="1" noChangeArrowheads="1"/>
+          </p:cNvPicPr>
+          <p:nvPr/>
+        </p:nvPicPr>
+        <p:blipFill>
+          <a:blip r:embed="rId3">
+            <a:extLst>
+              <a:ext uri="{28A0092B-C50C-407E-A947-70E740481C1C}">
+                <a14:useLocalDpi xmlns:a14="http://schemas.microsoft.com/office/drawing/2010/main" val="0"/>
+              </a:ext>
+            </a:extLst>
+          </a:blip>
+          <a:srcRect/>
+          <a:stretch>
+            <a:fillRect/>
+          </a:stretch>
+        </p:blipFill>
+        <p:spPr bwMode="auto">
+          <a:xfrm>
+            <a:off x="0" y="0"/>
+            <a:ext cx="133350" cy="133350"/>
+          </a:xfrm>
+          <a:prstGeom prst="rect">
+            <a:avLst/>
+          </a:prstGeom>
+          <a:noFill/>
+          <a:extLst>
+            <a:ext uri="{909E8E84-426E-40DD-AFC4-6F175D3DCCD1}">
+              <a14:hiddenFill xmlns:a14="http://schemas.microsoft.com/office/drawing/2010/main">
+                <a:solidFill>
+                  <a:srgbClr val="FFFFFF"/>
+                </a:solidFill>
+              </a14:hiddenFill>
+            </a:ext>
+          </a:extLst>
+        </p:spPr>
+      </p:pic>
+      <p:pic>
+        <p:nvPicPr>
+          <p:cNvPr id="2051" name="Picture 2" descr="check">
+            <a:extLst>
+              <a:ext uri="{FF2B5EF4-FFF2-40B4-BE49-F238E27FC236}">
+                <a16:creationId xmlns:a16="http://schemas.microsoft.com/office/drawing/2014/main" id="{78300109-7A83-4484-8401-B9245A233358}"/>
+              </a:ext>
+            </a:extLst>
+          </p:cNvPr>
+          <p:cNvPicPr>
+            <a:picLocks noChangeAspect="1" noChangeArrowheads="1"/>
+          </p:cNvPicPr>
+          <p:nvPr/>
+        </p:nvPicPr>
+        <p:blipFill>
+          <a:blip r:embed="rId4">
+            <a:extLst>
+              <a:ext uri="{28A0092B-C50C-407E-A947-70E740481C1C}">
+                <a14:useLocalDpi xmlns:a14="http://schemas.microsoft.com/office/drawing/2010/main" val="0"/>
+              </a:ext>
+            </a:extLst>
+          </a:blip>
+          <a:srcRect/>
+          <a:stretch>
+            <a:fillRect/>
+          </a:stretch>
+        </p:blipFill>
+        <p:spPr bwMode="auto">
+          <a:xfrm>
+            <a:off x="0" y="0"/>
+            <a:ext cx="133350" cy="133350"/>
+          </a:xfrm>
+          <a:prstGeom prst="rect">
+            <a:avLst/>
+          </a:prstGeom>
+          <a:noFill/>
+          <a:extLst>
+            <a:ext uri="{909E8E84-426E-40DD-AFC4-6F175D3DCCD1}">
+              <a14:hiddenFill xmlns:a14="http://schemas.microsoft.com/office/drawing/2010/main">
+                <a:solidFill>
+                  <a:srgbClr val="FFFFFF"/>
+                </a:solidFill>
+              </a14:hiddenFill>
+            </a:ext>
+          </a:extLst>
+        </p:spPr>
+      </p:pic>
+      <p:sp>
+        <p:nvSpPr>
+          <p:cNvPr id="6" name="Rectangle 5">
+            <a:extLst>
+              <a:ext uri="{FF2B5EF4-FFF2-40B4-BE49-F238E27FC236}">
+                <a16:creationId xmlns:a16="http://schemas.microsoft.com/office/drawing/2014/main" id="{4CDC3DAE-5A73-4F19-90A4-6B6D749FB72E}"/>
+              </a:ext>
+            </a:extLst>
+          </p:cNvPr>
+          <p:cNvSpPr/>
+          <p:nvPr/>
+        </p:nvSpPr>
+        <p:spPr>
+          <a:xfrm>
+            <a:off x="838197" y="2307663"/>
+            <a:ext cx="10469526" cy="411088"/>
+          </a:xfrm>
+          <a:prstGeom prst="rect">
+            <a:avLst/>
+          </a:prstGeom>
+          <a:noFill/>
+          <a:ln w="25400"/>
+        </p:spPr>
+        <p:style>
+          <a:lnRef idx="2">
+            <a:schemeClr val="accent1">
+              <a:shade val="50000"/>
+            </a:schemeClr>
+          </a:lnRef>
+          <a:fillRef idx="1">
+            <a:schemeClr val="accent1"/>
+          </a:fillRef>
+          <a:effectRef idx="0">
+            <a:schemeClr val="accent1"/>
+          </a:effectRef>
+          <a:fontRef idx="minor">
+            <a:schemeClr val="lt1"/>
+          </a:fontRef>
+        </p:style>
+        <p:txBody>
+          <a:bodyPr rtlCol="0" anchor="ctr"/>
+          <a:lstStyle/>
+          <a:p>
+            <a:pPr algn="ctr"/>
+            <a:endParaRPr lang="en-US"/>
+          </a:p>
+        </p:txBody>
+      </p:sp>
+      <p:sp>
+        <p:nvSpPr>
+          <p:cNvPr id="7" name="Rectangle 6">
+            <a:extLst>
+              <a:ext uri="{FF2B5EF4-FFF2-40B4-BE49-F238E27FC236}">
+                <a16:creationId xmlns:a16="http://schemas.microsoft.com/office/drawing/2014/main" id="{E58169D8-68C6-4F70-95C7-03AF8BF58A5E}"/>
+              </a:ext>
+            </a:extLst>
+          </p:cNvPr>
+          <p:cNvSpPr/>
+          <p:nvPr/>
+        </p:nvSpPr>
+        <p:spPr>
+          <a:xfrm>
+            <a:off x="838197" y="3584725"/>
+            <a:ext cx="10469526" cy="537409"/>
+          </a:xfrm>
+          <a:prstGeom prst="rect">
+            <a:avLst/>
+          </a:prstGeom>
+          <a:noFill/>
+          <a:ln w="25400"/>
+        </p:spPr>
+        <p:style>
+          <a:lnRef idx="2">
+            <a:schemeClr val="accent1">
+              <a:shade val="50000"/>
+            </a:schemeClr>
+          </a:lnRef>
+          <a:fillRef idx="1">
+            <a:schemeClr val="accent1"/>
+          </a:fillRef>
+          <a:effectRef idx="0">
+            <a:schemeClr val="accent1"/>
+          </a:effectRef>
+          <a:fontRef idx="minor">
+            <a:schemeClr val="lt1"/>
+          </a:fontRef>
+        </p:style>
+        <p:txBody>
+          <a:bodyPr rtlCol="0" anchor="ctr"/>
+          <a:lstStyle/>
+          <a:p>
+            <a:pPr algn="ctr"/>
+            <a:endParaRPr lang="en-US"/>
+          </a:p>
+        </p:txBody>
+      </p:sp>
+      <p:sp>
+        <p:nvSpPr>
+          <p:cNvPr id="8" name="Rectangle 7">
+            <a:extLst>
+              <a:ext uri="{FF2B5EF4-FFF2-40B4-BE49-F238E27FC236}">
+                <a16:creationId xmlns:a16="http://schemas.microsoft.com/office/drawing/2014/main" id="{615E87CA-EFD6-4A3A-8698-36A301AC93CF}"/>
+              </a:ext>
+            </a:extLst>
+          </p:cNvPr>
+          <p:cNvSpPr/>
+          <p:nvPr/>
+        </p:nvSpPr>
+        <p:spPr>
+          <a:xfrm>
+            <a:off x="884274" y="4871693"/>
+            <a:ext cx="10469526" cy="411088"/>
+          </a:xfrm>
+          <a:prstGeom prst="rect">
+            <a:avLst/>
+          </a:prstGeom>
+          <a:noFill/>
+          <a:ln w="25400"/>
+        </p:spPr>
+        <p:style>
+          <a:lnRef idx="2">
+            <a:schemeClr val="accent1">
+              <a:shade val="50000"/>
+            </a:schemeClr>
+          </a:lnRef>
+          <a:fillRef idx="1">
+            <a:schemeClr val="accent1"/>
+          </a:fillRef>
+          <a:effectRef idx="0">
+            <a:schemeClr val="accent1"/>
+          </a:effectRef>
+          <a:fontRef idx="minor">
+            <a:schemeClr val="lt1"/>
+          </a:fontRef>
+        </p:style>
+        <p:txBody>
+          <a:bodyPr rtlCol="0" anchor="ctr"/>
+          <a:lstStyle/>
+          <a:p>
+            <a:pPr algn="ctr"/>
+            <a:endParaRPr lang="en-US"/>
+          </a:p>
+        </p:txBody>
+      </p:sp>
+      <p:sp>
+        <p:nvSpPr>
+          <p:cNvPr id="12" name="Content Placeholder 2">
+            <a:extLst>
+              <a:ext uri="{FF2B5EF4-FFF2-40B4-BE49-F238E27FC236}">
+                <a16:creationId xmlns:a16="http://schemas.microsoft.com/office/drawing/2014/main" id="{6920AC3B-8F45-40AC-8E8E-F8F0549E6A2B}"/>
+              </a:ext>
+            </a:extLst>
+          </p:cNvPr>
+          <p:cNvSpPr txBox="1">
+            <a:spLocks/>
+          </p:cNvSpPr>
+          <p:nvPr/>
+        </p:nvSpPr>
+        <p:spPr>
+          <a:xfrm>
+            <a:off x="815159" y="6204010"/>
+            <a:ext cx="10515601" cy="343485"/>
+          </a:xfrm>
+          <a:prstGeom prst="rect">
+            <a:avLst/>
+          </a:prstGeom>
+        </p:spPr>
+        <p:txBody>
+          <a:bodyPr vert="horz" lIns="91440" tIns="45720" rIns="91440" bIns="45720" rtlCol="0">
+            <a:normAutofit lnSpcReduction="10000"/>
+          </a:bodyPr>
+          <a:lstStyle>
+            <a:lvl1pPr marL="228600" indent="-228600" algn="l" defTabSz="914400" rtl="0" eaLnBrk="1" latinLnBrk="0" hangingPunct="1">
+              <a:lnSpc>
+                <a:spcPct val="90000"/>
+              </a:lnSpc>
+              <a:spcBef>
+                <a:spcPts val="1000"/>
+              </a:spcBef>
+              <a:buFont typeface="Arial" panose="020B0604020202020204" pitchFamily="34" charset="0"/>
+              <a:buChar char="•"/>
+              <a:defRPr sz="2800" kern="1200">
+                <a:solidFill>
+                  <a:schemeClr val="tx1"/>
+                </a:solidFill>
+                <a:latin typeface="+mn-lt"/>
+                <a:ea typeface="+mn-ea"/>
+                <a:cs typeface="+mn-cs"/>
+              </a:defRPr>
+            </a:lvl1pPr>
+            <a:lvl2pPr marL="685800" indent="-228600" algn="l" defTabSz="914400" rtl="0" eaLnBrk="1" latinLnBrk="0" hangingPunct="1">
+              <a:lnSpc>
+                <a:spcPct val="90000"/>
+              </a:lnSpc>
+              <a:spcBef>
+                <a:spcPts val="500"/>
+              </a:spcBef>
+              <a:buFont typeface="Arial" panose="020B0604020202020204" pitchFamily="34" charset="0"/>
+              <a:buChar char="•"/>
+              <a:defRPr sz="2400" kern="1200">
+                <a:solidFill>
+                  <a:schemeClr val="tx1"/>
+                </a:solidFill>
+                <a:latin typeface="+mn-lt"/>
+                <a:ea typeface="+mn-ea"/>
+                <a:cs typeface="+mn-cs"/>
+              </a:defRPr>
+            </a:lvl2pPr>
+            <a:lvl3pPr marL="1143000" indent="-228600" algn="l" defTabSz="914400" rtl="0" eaLnBrk="1" latinLnBrk="0" hangingPunct="1">
+              <a:lnSpc>
+                <a:spcPct val="90000"/>
+              </a:lnSpc>
+              <a:spcBef>
+                <a:spcPts val="500"/>
+              </a:spcBef>
+              <a:buFont typeface="Arial" panose="020B0604020202020204" pitchFamily="34" charset="0"/>
+              <a:buChar char="•"/>
+              <a:defRPr sz="2000" kern="1200">
+                <a:solidFill>
+                  <a:schemeClr val="tx1"/>
+                </a:solidFill>
+                <a:latin typeface="+mn-lt"/>
+                <a:ea typeface="+mn-ea"/>
+                <a:cs typeface="+mn-cs"/>
+              </a:defRPr>
+            </a:lvl3pPr>
+            <a:lvl4pPr marL="1600200" indent="-228600" algn="l" defTabSz="914400" rtl="0" eaLnBrk="1" latinLnBrk="0" hangingPunct="1">
+              <a:lnSpc>
+                <a:spcPct val="90000"/>
+              </a:lnSpc>
+              <a:spcBef>
+                <a:spcPts val="500"/>
+              </a:spcBef>
+              <a:buFont typeface="Arial" panose="020B0604020202020204" pitchFamily="34" charset="0"/>
+              <a:buChar char="•"/>
+              <a:defRPr sz="1800" kern="1200">
+                <a:solidFill>
+                  <a:schemeClr val="tx1"/>
+                </a:solidFill>
+                <a:latin typeface="+mn-lt"/>
+                <a:ea typeface="+mn-ea"/>
+                <a:cs typeface="+mn-cs"/>
+              </a:defRPr>
+            </a:lvl4pPr>
+            <a:lvl5pPr marL="2057400" indent="-228600" algn="l" defTabSz="914400" rtl="0" eaLnBrk="1" latinLnBrk="0" hangingPunct="1">
+              <a:lnSpc>
+                <a:spcPct val="90000"/>
+              </a:lnSpc>
+              <a:spcBef>
+                <a:spcPts val="500"/>
+              </a:spcBef>
+              <a:buFont typeface="Arial" panose="020B0604020202020204" pitchFamily="34" charset="0"/>
+              <a:buChar char="•"/>
+              <a:defRPr sz="1800" kern="1200">
+                <a:solidFill>
+                  <a:schemeClr val="tx1"/>
+                </a:solidFill>
+                <a:latin typeface="+mn-lt"/>
+                <a:ea typeface="+mn-ea"/>
+                <a:cs typeface="+mn-cs"/>
+              </a:defRPr>
+            </a:lvl5pPr>
+            <a:lvl6pPr marL="2514600" indent="-228600" algn="l" defTabSz="914400" rtl="0" eaLnBrk="1" latinLnBrk="0" hangingPunct="1">
+              <a:lnSpc>
+                <a:spcPct val="90000"/>
+              </a:lnSpc>
+              <a:spcBef>
+                <a:spcPts val="500"/>
+              </a:spcBef>
+              <a:buFont typeface="Arial" panose="020B0604020202020204" pitchFamily="34" charset="0"/>
+              <a:buChar char="•"/>
+              <a:defRPr sz="1800" kern="1200">
+                <a:solidFill>
+                  <a:schemeClr val="tx1"/>
+                </a:solidFill>
+                <a:latin typeface="+mn-lt"/>
+                <a:ea typeface="+mn-ea"/>
+                <a:cs typeface="+mn-cs"/>
+              </a:defRPr>
+            </a:lvl6pPr>
+            <a:lvl7pPr marL="2971800" indent="-228600" algn="l" defTabSz="914400" rtl="0" eaLnBrk="1" latinLnBrk="0" hangingPunct="1">
+              <a:lnSpc>
+                <a:spcPct val="90000"/>
+              </a:lnSpc>
+              <a:spcBef>
+                <a:spcPts val="500"/>
+              </a:spcBef>
+              <a:buFont typeface="Arial" panose="020B0604020202020204" pitchFamily="34" charset="0"/>
+              <a:buChar char="•"/>
+              <a:defRPr sz="1800" kern="1200">
+                <a:solidFill>
+                  <a:schemeClr val="tx1"/>
+                </a:solidFill>
+                <a:latin typeface="+mn-lt"/>
+                <a:ea typeface="+mn-ea"/>
+                <a:cs typeface="+mn-cs"/>
+              </a:defRPr>
+            </a:lvl7pPr>
+            <a:lvl8pPr marL="3429000" indent="-228600" algn="l" defTabSz="914400" rtl="0" eaLnBrk="1" latinLnBrk="0" hangingPunct="1">
+              <a:lnSpc>
+                <a:spcPct val="90000"/>
+              </a:lnSpc>
+              <a:spcBef>
+                <a:spcPts val="500"/>
+              </a:spcBef>
+              <a:buFont typeface="Arial" panose="020B0604020202020204" pitchFamily="34" charset="0"/>
+              <a:buChar char="•"/>
+              <a:defRPr sz="1800" kern="1200">
+                <a:solidFill>
+                  <a:schemeClr val="tx1"/>
+                </a:solidFill>
+                <a:latin typeface="+mn-lt"/>
+                <a:ea typeface="+mn-ea"/>
+                <a:cs typeface="+mn-cs"/>
+              </a:defRPr>
+            </a:lvl8pPr>
+            <a:lvl9pPr marL="3886200" indent="-228600" algn="l" defTabSz="914400" rtl="0" eaLnBrk="1" latinLnBrk="0" hangingPunct="1">
+              <a:lnSpc>
+                <a:spcPct val="90000"/>
+              </a:lnSpc>
+              <a:spcBef>
+                <a:spcPts val="500"/>
+              </a:spcBef>
+              <a:buFont typeface="Arial" panose="020B0604020202020204" pitchFamily="34" charset="0"/>
+              <a:buChar char="•"/>
+              <a:defRPr sz="1800" kern="1200">
+                <a:solidFill>
+                  <a:schemeClr val="tx1"/>
+                </a:solidFill>
+                <a:latin typeface="+mn-lt"/>
+                <a:ea typeface="+mn-ea"/>
+                <a:cs typeface="+mn-cs"/>
+              </a:defRPr>
+            </a:lvl9pPr>
+          </a:lstStyle>
+          <a:p>
+            <a:pPr marL="0" indent="0">
+              <a:buNone/>
+            </a:pPr>
+            <a:r>
+              <a:rPr lang="en-US" sz="2000" dirty="0"/>
+              <a:t>** Invest the time!</a:t>
+            </a:r>
+          </a:p>
+          <a:p>
+            <a:pPr marL="457200" indent="-457200">
+              <a:buFont typeface="+mj-lt"/>
+              <a:buAutoNum type="arabicPeriod"/>
+            </a:pPr>
+            <a:endParaRPr lang="en-US" sz="2000" dirty="0"/>
+          </a:p>
+          <a:p>
+            <a:endParaRPr lang="en-US" sz="2000" dirty="0"/>
+          </a:p>
+          <a:p>
+            <a:pPr marL="0" indent="0">
+              <a:buFont typeface="Arial" panose="020B0604020202020204" pitchFamily="34" charset="0"/>
+              <a:buNone/>
+            </a:pPr>
+            <a:endParaRPr lang="en-US" sz="2000" dirty="0"/>
+          </a:p>
+          <a:p>
+            <a:pPr marL="0" indent="0">
+              <a:buFont typeface="Arial" panose="020B0604020202020204" pitchFamily="34" charset="0"/>
+              <a:buNone/>
+            </a:pPr>
+            <a:endParaRPr lang="en-US" sz="2000" dirty="0"/>
+          </a:p>
+          <a:p>
+            <a:pPr marL="0" indent="0">
+              <a:buFont typeface="Arial" panose="020B0604020202020204" pitchFamily="34" charset="0"/>
+              <a:buNone/>
+            </a:pPr>
+            <a:endParaRPr lang="en-US" sz="2000" dirty="0"/>
+          </a:p>
+          <a:p>
+            <a:pPr marL="0" indent="0">
+              <a:buFont typeface="Arial" panose="020B0604020202020204" pitchFamily="34" charset="0"/>
+              <a:buNone/>
+            </a:pPr>
+            <a:endParaRPr lang="en-US" sz="2000" dirty="0"/>
+          </a:p>
+          <a:p>
+            <a:pPr marL="0" indent="0">
+              <a:buFont typeface="Arial" panose="020B0604020202020204" pitchFamily="34" charset="0"/>
+              <a:buNone/>
+            </a:pPr>
+            <a:endParaRPr lang="en-US" sz="2000" dirty="0"/>
+          </a:p>
+        </p:txBody>
+      </p:sp>
+      <p:sp>
+        <p:nvSpPr>
+          <p:cNvPr id="13" name="Rectangle 12">
+            <a:extLst>
+              <a:ext uri="{FF2B5EF4-FFF2-40B4-BE49-F238E27FC236}">
+                <a16:creationId xmlns:a16="http://schemas.microsoft.com/office/drawing/2014/main" id="{E4117ACF-FDAD-407E-8458-B1C74B98B16B}"/>
+              </a:ext>
+            </a:extLst>
+          </p:cNvPr>
+          <p:cNvSpPr/>
+          <p:nvPr/>
+        </p:nvSpPr>
+        <p:spPr>
+          <a:xfrm>
+            <a:off x="861235" y="6136407"/>
+            <a:ext cx="10469526" cy="411088"/>
+          </a:xfrm>
+          <a:prstGeom prst="rect">
+            <a:avLst/>
+          </a:prstGeom>
+          <a:noFill/>
+          <a:ln w="25400"/>
+        </p:spPr>
+        <p:style>
+          <a:lnRef idx="2">
+            <a:schemeClr val="accent1">
+              <a:shade val="50000"/>
+            </a:schemeClr>
+          </a:lnRef>
+          <a:fillRef idx="1">
+            <a:schemeClr val="accent1"/>
+          </a:fillRef>
+          <a:effectRef idx="0">
+            <a:schemeClr val="accent1"/>
+          </a:effectRef>
+          <a:fontRef idx="minor">
+            <a:schemeClr val="lt1"/>
+          </a:fontRef>
+        </p:style>
+        <p:txBody>
+          <a:bodyPr rtlCol="0" anchor="ctr"/>
+          <a:lstStyle/>
+          <a:p>
+            <a:pPr algn="ctr"/>
+            <a:endParaRPr lang="en-US"/>
           </a:p>
         </p:txBody>
       </p:sp>
     </p:spTree>
     <p:extLst>
       <p:ext uri="{BB962C8B-B14F-4D97-AF65-F5344CB8AC3E}">
-        <p14:creationId xmlns:p14="http://schemas.microsoft.com/office/powerpoint/2010/main" val="3973654728"/>
+        <p14:creationId xmlns:p14="http://schemas.microsoft.com/office/powerpoint/2010/main" val="1093558091"/>
+      </p:ext>
+    </p:extLst>
+  </p:cSld>
+  <p:clrMapOvr>
+    <a:masterClrMapping/>
+  </p:clrMapOvr>
+  <p:timing>
+    <p:tnLst>
+      <p:par>
+        <p:cTn id="1" dur="indefinite" restart="never" nodeType="tmRoot">
+          <p:childTnLst>
+            <p:seq concurrent="1" nextAc="seek">
+              <p:cTn id="2" dur="indefinite" nodeType="mainSeq">
+                <p:childTnLst>
+                  <p:par>
+                    <p:cTn id="3" fill="hold">
+                      <p:stCondLst>
+                        <p:cond delay="indefinite"/>
+                        <p:cond evt="onBegin" delay="0">
+                          <p:tn val="2"/>
+                        </p:cond>
+                      </p:stCondLst>
+                      <p:childTnLst>
+                        <p:par>
+                          <p:cTn id="4" fill="hold">
+                            <p:stCondLst>
+                              <p:cond delay="0"/>
+                            </p:stCondLst>
+                            <p:childTnLst>
+                              <p:par>
+                                <p:cTn id="5" presetID="10" presetClass="entr" presetSubtype="0" fill="hold" grpId="0" nodeType="withEffect">
+                                  <p:stCondLst>
+                                    <p:cond delay="0"/>
+                                  </p:stCondLst>
+                                  <p:childTnLst>
+                                    <p:set>
+                                      <p:cBhvr>
+                                        <p:cTn id="6" dur="1" fill="hold">
+                                          <p:stCondLst>
+                                            <p:cond delay="0"/>
+                                          </p:stCondLst>
+                                        </p:cTn>
+                                        <p:tgtEl>
+                                          <p:spTgt spid="6"/>
+                                        </p:tgtEl>
+                                        <p:attrNameLst>
+                                          <p:attrName>style.visibility</p:attrName>
+                                        </p:attrNameLst>
+                                      </p:cBhvr>
+                                      <p:to>
+                                        <p:strVal val="visible"/>
+                                      </p:to>
+                                    </p:set>
+                                    <p:animEffect transition="in" filter="fade">
+                                      <p:cBhvr>
+                                        <p:cTn id="7" dur="500"/>
+                                        <p:tgtEl>
+                                          <p:spTgt spid="6"/>
+                                        </p:tgtEl>
+                                      </p:cBhvr>
+                                    </p:animEffect>
+                                  </p:childTnLst>
+                                </p:cTn>
+                              </p:par>
+                              <p:par>
+                                <p:cTn id="8" presetID="10" presetClass="entr" presetSubtype="0" fill="hold" grpId="0" nodeType="withEffect">
+                                  <p:stCondLst>
+                                    <p:cond delay="0"/>
+                                  </p:stCondLst>
+                                  <p:childTnLst>
+                                    <p:set>
+                                      <p:cBhvr>
+                                        <p:cTn id="9" dur="1" fill="hold">
+                                          <p:stCondLst>
+                                            <p:cond delay="0"/>
+                                          </p:stCondLst>
+                                        </p:cTn>
+                                        <p:tgtEl>
+                                          <p:spTgt spid="7"/>
+                                        </p:tgtEl>
+                                        <p:attrNameLst>
+                                          <p:attrName>style.visibility</p:attrName>
+                                        </p:attrNameLst>
+                                      </p:cBhvr>
+                                      <p:to>
+                                        <p:strVal val="visible"/>
+                                      </p:to>
+                                    </p:set>
+                                    <p:animEffect transition="in" filter="fade">
+                                      <p:cBhvr>
+                                        <p:cTn id="10" dur="500"/>
+                                        <p:tgtEl>
+                                          <p:spTgt spid="7"/>
+                                        </p:tgtEl>
+                                      </p:cBhvr>
+                                    </p:animEffect>
+                                  </p:childTnLst>
+                                </p:cTn>
+                              </p:par>
+                              <p:par>
+                                <p:cTn id="11" presetID="10" presetClass="entr" presetSubtype="0" fill="hold" grpId="0" nodeType="withEffect">
+                                  <p:stCondLst>
+                                    <p:cond delay="0"/>
+                                  </p:stCondLst>
+                                  <p:childTnLst>
+                                    <p:set>
+                                      <p:cBhvr>
+                                        <p:cTn id="12" dur="1" fill="hold">
+                                          <p:stCondLst>
+                                            <p:cond delay="0"/>
+                                          </p:stCondLst>
+                                        </p:cTn>
+                                        <p:tgtEl>
+                                          <p:spTgt spid="8"/>
+                                        </p:tgtEl>
+                                        <p:attrNameLst>
+                                          <p:attrName>style.visibility</p:attrName>
+                                        </p:attrNameLst>
+                                      </p:cBhvr>
+                                      <p:to>
+                                        <p:strVal val="visible"/>
+                                      </p:to>
+                                    </p:set>
+                                    <p:animEffect transition="in" filter="fade">
+                                      <p:cBhvr>
+                                        <p:cTn id="13" dur="500"/>
+                                        <p:tgtEl>
+                                          <p:spTgt spid="8"/>
+                                        </p:tgtEl>
+                                      </p:cBhvr>
+                                    </p:animEffect>
+                                  </p:childTnLst>
+                                </p:cTn>
+                              </p:par>
+                            </p:childTnLst>
+                          </p:cTn>
+                        </p:par>
+                      </p:childTnLst>
+                    </p:cTn>
+                  </p:par>
+                  <p:par>
+                    <p:cTn id="14" fill="hold">
+                      <p:stCondLst>
+                        <p:cond delay="indefinite"/>
+                      </p:stCondLst>
+                      <p:childTnLst>
+                        <p:par>
+                          <p:cTn id="15" fill="hold">
+                            <p:stCondLst>
+                              <p:cond delay="0"/>
+                            </p:stCondLst>
+                            <p:childTnLst>
+                              <p:par>
+                                <p:cTn id="16" presetID="10" presetClass="entr" presetSubtype="0" fill="hold" grpId="0" nodeType="clickEffect">
+                                  <p:stCondLst>
+                                    <p:cond delay="0"/>
+                                  </p:stCondLst>
+                                  <p:childTnLst>
+                                    <p:set>
+                                      <p:cBhvr>
+                                        <p:cTn id="17" dur="1" fill="hold">
+                                          <p:stCondLst>
+                                            <p:cond delay="0"/>
+                                          </p:stCondLst>
+                                        </p:cTn>
+                                        <p:tgtEl>
+                                          <p:spTgt spid="12"/>
+                                        </p:tgtEl>
+                                        <p:attrNameLst>
+                                          <p:attrName>style.visibility</p:attrName>
+                                        </p:attrNameLst>
+                                      </p:cBhvr>
+                                      <p:to>
+                                        <p:strVal val="visible"/>
+                                      </p:to>
+                                    </p:set>
+                                    <p:animEffect transition="in" filter="fade">
+                                      <p:cBhvr>
+                                        <p:cTn id="18" dur="500"/>
+                                        <p:tgtEl>
+                                          <p:spTgt spid="12"/>
+                                        </p:tgtEl>
+                                      </p:cBhvr>
+                                    </p:animEffect>
+                                  </p:childTnLst>
+                                </p:cTn>
+                              </p:par>
+                              <p:par>
+                                <p:cTn id="19" presetID="10" presetClass="entr" presetSubtype="0" fill="hold" grpId="0" nodeType="withEffect">
+                                  <p:stCondLst>
+                                    <p:cond delay="0"/>
+                                  </p:stCondLst>
+                                  <p:childTnLst>
+                                    <p:set>
+                                      <p:cBhvr>
+                                        <p:cTn id="20" dur="1" fill="hold">
+                                          <p:stCondLst>
+                                            <p:cond delay="0"/>
+                                          </p:stCondLst>
+                                        </p:cTn>
+                                        <p:tgtEl>
+                                          <p:spTgt spid="13"/>
+                                        </p:tgtEl>
+                                        <p:attrNameLst>
+                                          <p:attrName>style.visibility</p:attrName>
+                                        </p:attrNameLst>
+                                      </p:cBhvr>
+                                      <p:to>
+                                        <p:strVal val="visible"/>
+                                      </p:to>
+                                    </p:set>
+                                    <p:animEffect transition="in" filter="fade">
+                                      <p:cBhvr>
+                                        <p:cTn id="21" dur="500"/>
+                                        <p:tgtEl>
+                                          <p:spTgt spid="13"/>
+                                        </p:tgtEl>
+                                      </p:cBhvr>
+                                    </p:animEffect>
+                                  </p:childTnLst>
+                                </p:cTn>
+                              </p:par>
+                            </p:childTnLst>
+                          </p:cTn>
+                        </p:par>
+                      </p:childTnLst>
+                    </p:cTn>
+                  </p:par>
+                </p:childTnLst>
+              </p:cTn>
+              <p:prevCondLst>
+                <p:cond evt="onPrev" delay="0">
+                  <p:tgtEl>
+                    <p:sldTgt/>
+                  </p:tgtEl>
+                </p:cond>
+              </p:prevCondLst>
+              <p:nextCondLst>
+                <p:cond evt="onNext" delay="0">
+                  <p:tgtEl>
+                    <p:sldTgt/>
+                  </p:tgtEl>
+                </p:cond>
+              </p:nextCondLst>
+            </p:seq>
+          </p:childTnLst>
+        </p:cTn>
+      </p:par>
+    </p:tnLst>
+    <p:bldLst>
+      <p:bldP spid="6" grpId="0" animBg="1"/>
+      <p:bldP spid="7" grpId="0" animBg="1"/>
+      <p:bldP spid="8" grpId="0" animBg="1"/>
+      <p:bldP spid="12" grpId="0"/>
+      <p:bldP spid="13" grpId="0" animBg="1"/>
+    </p:bldLst>
+  </p:timing>
+</p:sld>
+</file>
+
+<file path=ppt/slides/slide13.xml><?xml version="1.0" encoding="utf-8"?>
+<p:sld xmlns:a="http://schemas.openxmlformats.org/drawingml/2006/main" xmlns:r="http://schemas.openxmlformats.org/officeDocument/2006/relationships" xmlns:p="http://schemas.openxmlformats.org/presentationml/2006/main">
+  <p:cSld>
+    <p:spTree>
+      <p:nvGrpSpPr>
+        <p:cNvPr id="1" name=""/>
+        <p:cNvGrpSpPr/>
+        <p:nvPr/>
+      </p:nvGrpSpPr>
+      <p:grpSpPr>
+        <a:xfrm>
+          <a:off x="0" y="0"/>
+          <a:ext cx="0" cy="0"/>
+          <a:chOff x="0" y="0"/>
+          <a:chExt cx="0" cy="0"/>
+        </a:xfrm>
+      </p:grpSpPr>
+      <p:sp>
+        <p:nvSpPr>
+          <p:cNvPr id="4" name="Title 1">
+            <a:extLst>
+              <a:ext uri="{FF2B5EF4-FFF2-40B4-BE49-F238E27FC236}">
+                <a16:creationId xmlns:a16="http://schemas.microsoft.com/office/drawing/2014/main" id="{527CE47F-3EF6-48CA-9239-E8B6E5C6B41A}"/>
+              </a:ext>
+            </a:extLst>
+          </p:cNvPr>
+          <p:cNvSpPr>
+            <a:spLocks noGrp="1"/>
+          </p:cNvSpPr>
+          <p:nvPr>
+            <p:ph type="title"/>
+          </p:nvPr>
+        </p:nvSpPr>
+        <p:spPr>
+          <a:xfrm>
+            <a:off x="838200" y="365125"/>
+            <a:ext cx="10515600" cy="1325563"/>
+          </a:xfrm>
+        </p:spPr>
+        <p:txBody>
+          <a:bodyPr>
+            <a:normAutofit/>
+          </a:bodyPr>
+          <a:lstStyle/>
+          <a:p>
+            <a:r>
+              <a:rPr lang="en-US" sz="3600" dirty="0"/>
+              <a:t>Coding Session Objectives</a:t>
+            </a:r>
+          </a:p>
+        </p:txBody>
+      </p:sp>
+      <p:sp>
+        <p:nvSpPr>
+          <p:cNvPr id="5" name="Content Placeholder 2">
+            <a:extLst>
+              <a:ext uri="{FF2B5EF4-FFF2-40B4-BE49-F238E27FC236}">
+                <a16:creationId xmlns:a16="http://schemas.microsoft.com/office/drawing/2014/main" id="{E8F0EA9A-219C-40FD-AE36-784EE1B77D56}"/>
+              </a:ext>
+            </a:extLst>
+          </p:cNvPr>
+          <p:cNvSpPr>
+            <a:spLocks noGrp="1"/>
+          </p:cNvSpPr>
+          <p:nvPr>
+            <p:ph idx="1"/>
+          </p:nvPr>
+        </p:nvSpPr>
+        <p:spPr>
+          <a:xfrm>
+            <a:off x="838198" y="1525772"/>
+            <a:ext cx="10515601" cy="4651191"/>
+          </a:xfrm>
+        </p:spPr>
+        <p:txBody>
+          <a:bodyPr>
+            <a:normAutofit/>
+          </a:bodyPr>
+          <a:lstStyle/>
+          <a:p>
+            <a:pPr marL="457200" indent="-457200">
+              <a:buFont typeface="+mj-lt"/>
+              <a:buAutoNum type="arabicPeriod"/>
+            </a:pPr>
+            <a:r>
+              <a:rPr lang="en-US" sz="2000" dirty="0"/>
+              <a:t>Become comfortable with your development environment/tools</a:t>
+            </a:r>
+          </a:p>
+          <a:p>
+            <a:pPr lvl="1"/>
+            <a:r>
+              <a:rPr lang="en-US" sz="1600" dirty="0"/>
+              <a:t>Chrome Developer Tools</a:t>
+            </a:r>
+          </a:p>
+          <a:p>
+            <a:pPr lvl="1"/>
+            <a:r>
+              <a:rPr lang="en-US" sz="1600" dirty="0"/>
+              <a:t>HTML and JavaScript Validator</a:t>
+            </a:r>
+          </a:p>
+          <a:p>
+            <a:pPr marL="457200" indent="-457200">
+              <a:buFont typeface="+mj-lt"/>
+              <a:buAutoNum type="arabicPeriod"/>
+            </a:pPr>
+            <a:r>
+              <a:rPr lang="en-US" sz="2000" dirty="0"/>
+              <a:t>Save and deploy working versions of your project regularly… this allows you to experiment without risking what you have already accomplished</a:t>
+            </a:r>
+          </a:p>
+          <a:p>
+            <a:pPr lvl="1"/>
+            <a:r>
+              <a:rPr lang="en-US" sz="1600" dirty="0"/>
+              <a:t>Start with a working, tested, and validated Hello World</a:t>
+            </a:r>
+          </a:p>
+          <a:p>
+            <a:pPr lvl="1"/>
+            <a:r>
+              <a:rPr lang="en-US" sz="1600" dirty="0"/>
+              <a:t>Make incremental enhancements in new files… or using source code control </a:t>
+            </a:r>
+          </a:p>
+          <a:p>
+            <a:pPr lvl="1"/>
+            <a:r>
+              <a:rPr lang="en-US" sz="1600" dirty="0"/>
+              <a:t>Be prepared to submit what you have at any point</a:t>
+            </a:r>
+          </a:p>
+          <a:p>
+            <a:pPr marL="457200" indent="-457200">
+              <a:buFont typeface="+mj-lt"/>
+              <a:buAutoNum type="arabicPeriod"/>
+            </a:pPr>
+            <a:r>
+              <a:rPr lang="en-US" sz="2000" dirty="0"/>
+              <a:t>Look for similar examples… but write your own code that you understand</a:t>
+            </a:r>
+          </a:p>
+          <a:p>
+            <a:pPr marL="457200" indent="-457200">
+              <a:buFont typeface="+mj-lt"/>
+              <a:buAutoNum type="arabicPeriod"/>
+            </a:pPr>
+            <a:r>
+              <a:rPr lang="en-US" sz="2000" dirty="0"/>
+              <a:t>Only you can choose to invest the time… time spent earlier in the project is worth more than time spent at the end</a:t>
+            </a:r>
+          </a:p>
+          <a:p>
+            <a:pPr marL="457200" indent="-457200">
+              <a:buFont typeface="+mj-lt"/>
+              <a:buAutoNum type="arabicPeriod"/>
+            </a:pPr>
+            <a:endParaRPr lang="en-US" sz="2000" dirty="0"/>
+          </a:p>
+          <a:p>
+            <a:pPr marL="457200" indent="-457200">
+              <a:buFont typeface="+mj-lt"/>
+              <a:buAutoNum type="arabicPeriod"/>
+            </a:pPr>
+            <a:endParaRPr lang="en-US" sz="2000" dirty="0"/>
+          </a:p>
+          <a:p>
+            <a:pPr marL="0" indent="0">
+              <a:buNone/>
+            </a:pPr>
+            <a:endParaRPr lang="en-US" sz="2000" dirty="0"/>
+          </a:p>
+          <a:p>
+            <a:pPr marL="457200" indent="-457200">
+              <a:buFont typeface="+mj-lt"/>
+              <a:buAutoNum type="arabicPeriod"/>
+            </a:pPr>
+            <a:endParaRPr lang="en-US" sz="2000" dirty="0"/>
+          </a:p>
+          <a:p>
+            <a:endParaRPr lang="en-US" sz="2000" dirty="0"/>
+          </a:p>
+          <a:p>
+            <a:pPr marL="0" indent="0">
+              <a:buNone/>
+            </a:pPr>
+            <a:endParaRPr lang="en-US" sz="2000" dirty="0"/>
+          </a:p>
+          <a:p>
+            <a:pPr marL="0" indent="0">
+              <a:buNone/>
+            </a:pPr>
+            <a:endParaRPr lang="en-US" sz="2000" dirty="0"/>
+          </a:p>
+          <a:p>
+            <a:pPr marL="0" indent="0">
+              <a:buNone/>
+            </a:pPr>
+            <a:endParaRPr lang="en-US" sz="2000" dirty="0"/>
+          </a:p>
+          <a:p>
+            <a:pPr marL="0" indent="0">
+              <a:buNone/>
+            </a:pPr>
+            <a:endParaRPr lang="en-US" sz="2000" dirty="0"/>
+          </a:p>
+          <a:p>
+            <a:pPr marL="0" indent="0">
+              <a:buNone/>
+            </a:pPr>
+            <a:endParaRPr lang="en-US" sz="2000" dirty="0"/>
+          </a:p>
+        </p:txBody>
+      </p:sp>
+      <p:pic>
+        <p:nvPicPr>
+          <p:cNvPr id="2050" name="Picture 1" descr="Incorrect">
+            <a:extLst>
+              <a:ext uri="{FF2B5EF4-FFF2-40B4-BE49-F238E27FC236}">
+                <a16:creationId xmlns:a16="http://schemas.microsoft.com/office/drawing/2014/main" id="{FF58184F-9DBB-46F2-9AD1-5DD64E112630}"/>
+              </a:ext>
+            </a:extLst>
+          </p:cNvPr>
+          <p:cNvPicPr>
+            <a:picLocks noChangeAspect="1" noChangeArrowheads="1"/>
+          </p:cNvPicPr>
+          <p:nvPr/>
+        </p:nvPicPr>
+        <p:blipFill>
+          <a:blip r:embed="rId3">
+            <a:extLst>
+              <a:ext uri="{28A0092B-C50C-407E-A947-70E740481C1C}">
+                <a14:useLocalDpi xmlns:a14="http://schemas.microsoft.com/office/drawing/2010/main" val="0"/>
+              </a:ext>
+            </a:extLst>
+          </a:blip>
+          <a:srcRect/>
+          <a:stretch>
+            <a:fillRect/>
+          </a:stretch>
+        </p:blipFill>
+        <p:spPr bwMode="auto">
+          <a:xfrm>
+            <a:off x="0" y="0"/>
+            <a:ext cx="133350" cy="133350"/>
+          </a:xfrm>
+          <a:prstGeom prst="rect">
+            <a:avLst/>
+          </a:prstGeom>
+          <a:noFill/>
+          <a:extLst>
+            <a:ext uri="{909E8E84-426E-40DD-AFC4-6F175D3DCCD1}">
+              <a14:hiddenFill xmlns:a14="http://schemas.microsoft.com/office/drawing/2010/main">
+                <a:solidFill>
+                  <a:srgbClr val="FFFFFF"/>
+                </a:solidFill>
+              </a14:hiddenFill>
+            </a:ext>
+          </a:extLst>
+        </p:spPr>
+      </p:pic>
+      <p:pic>
+        <p:nvPicPr>
+          <p:cNvPr id="2051" name="Picture 2" descr="check">
+            <a:extLst>
+              <a:ext uri="{FF2B5EF4-FFF2-40B4-BE49-F238E27FC236}">
+                <a16:creationId xmlns:a16="http://schemas.microsoft.com/office/drawing/2014/main" id="{78300109-7A83-4484-8401-B9245A233358}"/>
+              </a:ext>
+            </a:extLst>
+          </p:cNvPr>
+          <p:cNvPicPr>
+            <a:picLocks noChangeAspect="1" noChangeArrowheads="1"/>
+          </p:cNvPicPr>
+          <p:nvPr/>
+        </p:nvPicPr>
+        <p:blipFill>
+          <a:blip r:embed="rId4">
+            <a:extLst>
+              <a:ext uri="{28A0092B-C50C-407E-A947-70E740481C1C}">
+                <a14:useLocalDpi xmlns:a14="http://schemas.microsoft.com/office/drawing/2010/main" val="0"/>
+              </a:ext>
+            </a:extLst>
+          </a:blip>
+          <a:srcRect/>
+          <a:stretch>
+            <a:fillRect/>
+          </a:stretch>
+        </p:blipFill>
+        <p:spPr bwMode="auto">
+          <a:xfrm>
+            <a:off x="0" y="0"/>
+            <a:ext cx="133350" cy="133350"/>
+          </a:xfrm>
+          <a:prstGeom prst="rect">
+            <a:avLst/>
+          </a:prstGeom>
+          <a:noFill/>
+          <a:extLst>
+            <a:ext uri="{909E8E84-426E-40DD-AFC4-6F175D3DCCD1}">
+              <a14:hiddenFill xmlns:a14="http://schemas.microsoft.com/office/drawing/2010/main">
+                <a:solidFill>
+                  <a:srgbClr val="FFFFFF"/>
+                </a:solidFill>
+              </a14:hiddenFill>
+            </a:ext>
+          </a:extLst>
+        </p:spPr>
+      </p:pic>
+    </p:spTree>
+    <p:extLst>
+      <p:ext uri="{BB962C8B-B14F-4D97-AF65-F5344CB8AC3E}">
+        <p14:creationId xmlns:p14="http://schemas.microsoft.com/office/powerpoint/2010/main" val="2662606289"/>
       </p:ext>
     </p:extLst>
   </p:cSld>
@@ -4951,7 +6695,1617 @@
 </p:sld>
 </file>
 
-<file path=ppt/slides/slide13.xml><?xml version="1.0" encoding="utf-8"?>
+<file path=ppt/slides/slide14.xml><?xml version="1.0" encoding="utf-8"?>
+<p:sld xmlns:a="http://schemas.openxmlformats.org/drawingml/2006/main" xmlns:r="http://schemas.openxmlformats.org/officeDocument/2006/relationships" xmlns:p="http://schemas.openxmlformats.org/presentationml/2006/main">
+  <p:cSld>
+    <p:spTree>
+      <p:nvGrpSpPr>
+        <p:cNvPr id="1" name=""/>
+        <p:cNvGrpSpPr/>
+        <p:nvPr/>
+      </p:nvGrpSpPr>
+      <p:grpSpPr>
+        <a:xfrm>
+          <a:off x="0" y="0"/>
+          <a:ext cx="0" cy="0"/>
+          <a:chOff x="0" y="0"/>
+          <a:chExt cx="0" cy="0"/>
+        </a:xfrm>
+      </p:grpSpPr>
+      <p:sp>
+        <p:nvSpPr>
+          <p:cNvPr id="4" name="Title 1">
+            <a:extLst>
+              <a:ext uri="{FF2B5EF4-FFF2-40B4-BE49-F238E27FC236}">
+                <a16:creationId xmlns:a16="http://schemas.microsoft.com/office/drawing/2014/main" id="{527CE47F-3EF6-48CA-9239-E8B6E5C6B41A}"/>
+              </a:ext>
+            </a:extLst>
+          </p:cNvPr>
+          <p:cNvSpPr>
+            <a:spLocks noGrp="1"/>
+          </p:cNvSpPr>
+          <p:nvPr>
+            <p:ph type="title"/>
+          </p:nvPr>
+        </p:nvSpPr>
+        <p:spPr>
+          <a:xfrm>
+            <a:off x="838200" y="365125"/>
+            <a:ext cx="10515600" cy="1325563"/>
+          </a:xfrm>
+        </p:spPr>
+        <p:txBody>
+          <a:bodyPr>
+            <a:normAutofit/>
+          </a:bodyPr>
+          <a:lstStyle/>
+          <a:p>
+            <a:r>
+              <a:rPr lang="en-US" sz="3600" dirty="0"/>
+              <a:t>Start With Working, Tested, and Validated Hello World</a:t>
+            </a:r>
+          </a:p>
+        </p:txBody>
+      </p:sp>
+      <p:sp>
+        <p:nvSpPr>
+          <p:cNvPr id="5" name="Content Placeholder 2">
+            <a:extLst>
+              <a:ext uri="{FF2B5EF4-FFF2-40B4-BE49-F238E27FC236}">
+                <a16:creationId xmlns:a16="http://schemas.microsoft.com/office/drawing/2014/main" id="{E8F0EA9A-219C-40FD-AE36-784EE1B77D56}"/>
+              </a:ext>
+            </a:extLst>
+          </p:cNvPr>
+          <p:cNvSpPr>
+            <a:spLocks noGrp="1"/>
+          </p:cNvSpPr>
+          <p:nvPr>
+            <p:ph idx="1"/>
+          </p:nvPr>
+        </p:nvSpPr>
+        <p:spPr>
+          <a:xfrm>
+            <a:off x="838198" y="1525772"/>
+            <a:ext cx="10515601" cy="4651191"/>
+          </a:xfrm>
+        </p:spPr>
+        <p:txBody>
+          <a:bodyPr>
+            <a:normAutofit/>
+          </a:bodyPr>
+          <a:lstStyle/>
+          <a:p>
+            <a:pPr marL="0" indent="0">
+              <a:buNone/>
+            </a:pPr>
+            <a:r>
+              <a:rPr lang="en-US" sz="2000" dirty="0"/>
+              <a:t>Yahtzee Dice Roller to Hello World… Let’s do this TOGETHER: </a:t>
+            </a:r>
+          </a:p>
+          <a:p>
+            <a:pPr marL="457200" indent="-457200">
+              <a:buFont typeface="+mj-lt"/>
+              <a:buAutoNum type="arabicPeriod"/>
+            </a:pPr>
+            <a:r>
+              <a:rPr lang="en-US" sz="2000" dirty="0"/>
+              <a:t>Copy ‘yahtzee-dice-roller-extern-js.html’ and ‘yahtzee-dice-roller-extern-js.js’ to working folder</a:t>
+            </a:r>
+          </a:p>
+          <a:p>
+            <a:pPr marL="457200" indent="-457200">
+              <a:buFont typeface="+mj-lt"/>
+              <a:buAutoNum type="arabicPeriod"/>
+            </a:pPr>
+            <a:r>
+              <a:rPr lang="en-US" sz="2000" dirty="0"/>
+              <a:t>Rename them to ‘hello-world.html’ and ‘hello-world.js’</a:t>
+            </a:r>
+          </a:p>
+          <a:p>
+            <a:pPr marL="457200" indent="-457200">
+              <a:buFont typeface="+mj-lt"/>
+              <a:buAutoNum type="arabicPeriod"/>
+            </a:pPr>
+            <a:r>
+              <a:rPr lang="en-US" sz="2000" dirty="0"/>
+              <a:t>Update the JavaScript link in ‘hello-world.html’</a:t>
+            </a:r>
+          </a:p>
+          <a:p>
+            <a:pPr marL="457200" indent="-457200">
+              <a:buFont typeface="+mj-lt"/>
+              <a:buAutoNum type="arabicPeriod"/>
+            </a:pPr>
+            <a:r>
+              <a:rPr lang="en-US" sz="2000" dirty="0"/>
+              <a:t>Test hello-world application… does it work?</a:t>
+            </a:r>
+          </a:p>
+          <a:p>
+            <a:pPr marL="457200" indent="-457200">
+              <a:buFont typeface="+mj-lt"/>
+              <a:buAutoNum type="arabicPeriod"/>
+            </a:pPr>
+            <a:r>
+              <a:rPr lang="en-US" sz="2000" dirty="0"/>
+              <a:t>Cut CSS code out of ‘hello-world.html’… see the change in behavior?</a:t>
+            </a:r>
+          </a:p>
+          <a:p>
+            <a:pPr marL="457200" indent="-457200">
+              <a:buFont typeface="+mj-lt"/>
+              <a:buAutoNum type="arabicPeriod"/>
+            </a:pPr>
+            <a:r>
+              <a:rPr lang="en-US" sz="2000" dirty="0"/>
+              <a:t>Create a new file ‘hello-world.css’, move CSS code to external file, past CSS code into external file, and add link to ‘hello-world.html’… does it work?</a:t>
+            </a:r>
+          </a:p>
+          <a:p>
+            <a:pPr marL="457200" indent="-457200">
+              <a:buFont typeface="+mj-lt"/>
+              <a:buAutoNum type="arabicPeriod"/>
+            </a:pPr>
+            <a:r>
+              <a:rPr lang="en-US" sz="2000" dirty="0"/>
+              <a:t>Add ‘console.log()’ message to ‘function random()’… test it with Developer Tools! Does it work? </a:t>
+            </a:r>
+          </a:p>
+          <a:p>
+            <a:pPr marL="457200" indent="-457200">
+              <a:buFont typeface="+mj-lt"/>
+              <a:buAutoNum type="arabicPeriod"/>
+            </a:pPr>
+            <a:r>
+              <a:rPr lang="en-US" sz="2000" dirty="0"/>
+              <a:t>Success!</a:t>
+            </a:r>
+          </a:p>
+          <a:p>
+            <a:pPr marL="457200" indent="-457200">
+              <a:buFont typeface="+mj-lt"/>
+              <a:buAutoNum type="arabicPeriod"/>
+            </a:pPr>
+            <a:endParaRPr lang="en-US" sz="2000" dirty="0"/>
+          </a:p>
+          <a:p>
+            <a:endParaRPr lang="en-US" sz="2000" dirty="0"/>
+          </a:p>
+          <a:p>
+            <a:pPr marL="0" indent="0">
+              <a:buNone/>
+            </a:pPr>
+            <a:endParaRPr lang="en-US" sz="2000" dirty="0"/>
+          </a:p>
+          <a:p>
+            <a:pPr marL="0" indent="0">
+              <a:buNone/>
+            </a:pPr>
+            <a:endParaRPr lang="en-US" sz="2000" dirty="0"/>
+          </a:p>
+          <a:p>
+            <a:pPr marL="0" indent="0">
+              <a:buNone/>
+            </a:pPr>
+            <a:endParaRPr lang="en-US" sz="2000" dirty="0"/>
+          </a:p>
+          <a:p>
+            <a:pPr marL="0" indent="0">
+              <a:buNone/>
+            </a:pPr>
+            <a:endParaRPr lang="en-US" sz="2000" dirty="0"/>
+          </a:p>
+          <a:p>
+            <a:pPr marL="0" indent="0">
+              <a:buNone/>
+            </a:pPr>
+            <a:endParaRPr lang="en-US" sz="2000" dirty="0"/>
+          </a:p>
+        </p:txBody>
+      </p:sp>
+      <p:pic>
+        <p:nvPicPr>
+          <p:cNvPr id="2050" name="Picture 1" descr="Incorrect">
+            <a:extLst>
+              <a:ext uri="{FF2B5EF4-FFF2-40B4-BE49-F238E27FC236}">
+                <a16:creationId xmlns:a16="http://schemas.microsoft.com/office/drawing/2014/main" id="{FF58184F-9DBB-46F2-9AD1-5DD64E112630}"/>
+              </a:ext>
+            </a:extLst>
+          </p:cNvPr>
+          <p:cNvPicPr>
+            <a:picLocks noChangeAspect="1" noChangeArrowheads="1"/>
+          </p:cNvPicPr>
+          <p:nvPr/>
+        </p:nvPicPr>
+        <p:blipFill>
+          <a:blip r:embed="rId3">
+            <a:extLst>
+              <a:ext uri="{28A0092B-C50C-407E-A947-70E740481C1C}">
+                <a14:useLocalDpi xmlns:a14="http://schemas.microsoft.com/office/drawing/2010/main" val="0"/>
+              </a:ext>
+            </a:extLst>
+          </a:blip>
+          <a:srcRect/>
+          <a:stretch>
+            <a:fillRect/>
+          </a:stretch>
+        </p:blipFill>
+        <p:spPr bwMode="auto">
+          <a:xfrm>
+            <a:off x="0" y="0"/>
+            <a:ext cx="133350" cy="133350"/>
+          </a:xfrm>
+          <a:prstGeom prst="rect">
+            <a:avLst/>
+          </a:prstGeom>
+          <a:noFill/>
+          <a:extLst>
+            <a:ext uri="{909E8E84-426E-40DD-AFC4-6F175D3DCCD1}">
+              <a14:hiddenFill xmlns:a14="http://schemas.microsoft.com/office/drawing/2010/main">
+                <a:solidFill>
+                  <a:srgbClr val="FFFFFF"/>
+                </a:solidFill>
+              </a14:hiddenFill>
+            </a:ext>
+          </a:extLst>
+        </p:spPr>
+      </p:pic>
+      <p:pic>
+        <p:nvPicPr>
+          <p:cNvPr id="2051" name="Picture 2" descr="check">
+            <a:extLst>
+              <a:ext uri="{FF2B5EF4-FFF2-40B4-BE49-F238E27FC236}">
+                <a16:creationId xmlns:a16="http://schemas.microsoft.com/office/drawing/2014/main" id="{78300109-7A83-4484-8401-B9245A233358}"/>
+              </a:ext>
+            </a:extLst>
+          </p:cNvPr>
+          <p:cNvPicPr>
+            <a:picLocks noChangeAspect="1" noChangeArrowheads="1"/>
+          </p:cNvPicPr>
+          <p:nvPr/>
+        </p:nvPicPr>
+        <p:blipFill>
+          <a:blip r:embed="rId4">
+            <a:extLst>
+              <a:ext uri="{28A0092B-C50C-407E-A947-70E740481C1C}">
+                <a14:useLocalDpi xmlns:a14="http://schemas.microsoft.com/office/drawing/2010/main" val="0"/>
+              </a:ext>
+            </a:extLst>
+          </a:blip>
+          <a:srcRect/>
+          <a:stretch>
+            <a:fillRect/>
+          </a:stretch>
+        </p:blipFill>
+        <p:spPr bwMode="auto">
+          <a:xfrm>
+            <a:off x="0" y="0"/>
+            <a:ext cx="133350" cy="133350"/>
+          </a:xfrm>
+          <a:prstGeom prst="rect">
+            <a:avLst/>
+          </a:prstGeom>
+          <a:noFill/>
+          <a:extLst>
+            <a:ext uri="{909E8E84-426E-40DD-AFC4-6F175D3DCCD1}">
+              <a14:hiddenFill xmlns:a14="http://schemas.microsoft.com/office/drawing/2010/main">
+                <a:solidFill>
+                  <a:srgbClr val="FFFFFF"/>
+                </a:solidFill>
+              </a14:hiddenFill>
+            </a:ext>
+          </a:extLst>
+        </p:spPr>
+      </p:pic>
+    </p:spTree>
+    <p:extLst>
+      <p:ext uri="{BB962C8B-B14F-4D97-AF65-F5344CB8AC3E}">
+        <p14:creationId xmlns:p14="http://schemas.microsoft.com/office/powerpoint/2010/main" val="3510599021"/>
+      </p:ext>
+    </p:extLst>
+  </p:cSld>
+  <p:clrMapOvr>
+    <a:masterClrMapping/>
+  </p:clrMapOvr>
+</p:sld>
+</file>
+
+<file path=ppt/slides/slide15.xml><?xml version="1.0" encoding="utf-8"?>
+<p:sld xmlns:a="http://schemas.openxmlformats.org/drawingml/2006/main" xmlns:r="http://schemas.openxmlformats.org/officeDocument/2006/relationships" xmlns:p="http://schemas.openxmlformats.org/presentationml/2006/main">
+  <p:cSld>
+    <p:spTree>
+      <p:nvGrpSpPr>
+        <p:cNvPr id="1" name=""/>
+        <p:cNvGrpSpPr/>
+        <p:nvPr/>
+      </p:nvGrpSpPr>
+      <p:grpSpPr>
+        <a:xfrm>
+          <a:off x="0" y="0"/>
+          <a:ext cx="0" cy="0"/>
+          <a:chOff x="0" y="0"/>
+          <a:chExt cx="0" cy="0"/>
+        </a:xfrm>
+      </p:grpSpPr>
+      <p:sp>
+        <p:nvSpPr>
+          <p:cNvPr id="4" name="Title 1">
+            <a:extLst>
+              <a:ext uri="{FF2B5EF4-FFF2-40B4-BE49-F238E27FC236}">
+                <a16:creationId xmlns:a16="http://schemas.microsoft.com/office/drawing/2014/main" id="{527CE47F-3EF6-48CA-9239-E8B6E5C6B41A}"/>
+              </a:ext>
+            </a:extLst>
+          </p:cNvPr>
+          <p:cNvSpPr>
+            <a:spLocks noGrp="1"/>
+          </p:cNvSpPr>
+          <p:nvPr>
+            <p:ph type="title"/>
+          </p:nvPr>
+        </p:nvSpPr>
+        <p:spPr>
+          <a:xfrm>
+            <a:off x="838200" y="365125"/>
+            <a:ext cx="10515600" cy="1325563"/>
+          </a:xfrm>
+        </p:spPr>
+        <p:txBody>
+          <a:bodyPr>
+            <a:normAutofit/>
+          </a:bodyPr>
+          <a:lstStyle/>
+          <a:p>
+            <a:r>
+              <a:rPr lang="en-US" sz="3600" dirty="0"/>
+              <a:t>Create A Safe Environment to Make Changes</a:t>
+            </a:r>
+          </a:p>
+        </p:txBody>
+      </p:sp>
+      <p:sp>
+        <p:nvSpPr>
+          <p:cNvPr id="5" name="Content Placeholder 2">
+            <a:extLst>
+              <a:ext uri="{FF2B5EF4-FFF2-40B4-BE49-F238E27FC236}">
+                <a16:creationId xmlns:a16="http://schemas.microsoft.com/office/drawing/2014/main" id="{E8F0EA9A-219C-40FD-AE36-784EE1B77D56}"/>
+              </a:ext>
+            </a:extLst>
+          </p:cNvPr>
+          <p:cNvSpPr>
+            <a:spLocks noGrp="1"/>
+          </p:cNvSpPr>
+          <p:nvPr>
+            <p:ph idx="1"/>
+          </p:nvPr>
+        </p:nvSpPr>
+        <p:spPr>
+          <a:xfrm>
+            <a:off x="838198" y="1525772"/>
+            <a:ext cx="10515601" cy="4651191"/>
+          </a:xfrm>
+        </p:spPr>
+        <p:txBody>
+          <a:bodyPr>
+            <a:normAutofit/>
+          </a:bodyPr>
+          <a:lstStyle/>
+          <a:p>
+            <a:pPr marL="0" indent="0">
+              <a:buNone/>
+            </a:pPr>
+            <a:r>
+              <a:rPr lang="en-US" sz="2000" dirty="0"/>
+              <a:t>Step 1 – Create initial Google Maps files: </a:t>
+            </a:r>
+          </a:p>
+          <a:p>
+            <a:pPr marL="457200" indent="-457200">
+              <a:buFont typeface="+mj-lt"/>
+              <a:buAutoNum type="arabicPeriod"/>
+            </a:pPr>
+            <a:r>
+              <a:rPr lang="en-US" sz="2000" dirty="0"/>
+              <a:t>Copy all three ‘hello-world’ files and name them ‘google-maps-step-01’ html, </a:t>
+            </a:r>
+            <a:r>
+              <a:rPr lang="en-US" sz="2000" dirty="0" err="1"/>
+              <a:t>css</a:t>
+            </a:r>
+            <a:r>
+              <a:rPr lang="en-US" sz="2000" dirty="0"/>
+              <a:t>, and </a:t>
+            </a:r>
+            <a:r>
+              <a:rPr lang="en-US" sz="2000" dirty="0" err="1"/>
+              <a:t>js</a:t>
+            </a:r>
+            <a:r>
+              <a:rPr lang="en-US" sz="2000" dirty="0"/>
+              <a:t> files</a:t>
+            </a:r>
+          </a:p>
+          <a:p>
+            <a:pPr marL="457200" indent="-457200">
+              <a:buFont typeface="+mj-lt"/>
+              <a:buAutoNum type="arabicPeriod"/>
+            </a:pPr>
+            <a:r>
+              <a:rPr lang="en-US" sz="2000" dirty="0"/>
+              <a:t>Update links in ‘google-maps-step-01.html’ to reflect new names</a:t>
+            </a:r>
+          </a:p>
+          <a:p>
+            <a:pPr marL="457200" indent="-457200">
+              <a:buFont typeface="+mj-lt"/>
+              <a:buAutoNum type="arabicPeriod"/>
+            </a:pPr>
+            <a:r>
+              <a:rPr lang="en-US" sz="2000" dirty="0"/>
+              <a:t>Update title to ‘Google Maps’</a:t>
+            </a:r>
+          </a:p>
+          <a:p>
+            <a:pPr marL="457200" indent="-457200">
+              <a:buFont typeface="+mj-lt"/>
+              <a:buAutoNum type="arabicPeriod"/>
+            </a:pPr>
+            <a:r>
+              <a:rPr lang="en-US" sz="2000" dirty="0"/>
+              <a:t>Update ‘console.log()’ message to reflect ‘Step 1’ and test new files</a:t>
+            </a:r>
+          </a:p>
+          <a:p>
+            <a:pPr marL="457200" indent="-457200">
+              <a:buFont typeface="+mj-lt"/>
+              <a:buAutoNum type="arabicPeriod"/>
+            </a:pPr>
+            <a:r>
+              <a:rPr lang="en-US" sz="2000" dirty="0"/>
+              <a:t>Test utilizing Google Developer Tools… does it work? </a:t>
+            </a:r>
+          </a:p>
+          <a:p>
+            <a:pPr marL="457200" indent="-457200">
+              <a:buFont typeface="+mj-lt"/>
+              <a:buAutoNum type="arabicPeriod"/>
+            </a:pPr>
+            <a:r>
+              <a:rPr lang="en-US" sz="2000" dirty="0"/>
+              <a:t>Success!</a:t>
+            </a:r>
+          </a:p>
+          <a:p>
+            <a:pPr marL="457200" indent="-457200">
+              <a:buFont typeface="+mj-lt"/>
+              <a:buAutoNum type="arabicPeriod"/>
+            </a:pPr>
+            <a:endParaRPr lang="en-US" sz="2000" dirty="0"/>
+          </a:p>
+          <a:p>
+            <a:endParaRPr lang="en-US" sz="2000" dirty="0"/>
+          </a:p>
+          <a:p>
+            <a:pPr marL="0" indent="0">
+              <a:buNone/>
+            </a:pPr>
+            <a:endParaRPr lang="en-US" sz="2000" dirty="0"/>
+          </a:p>
+          <a:p>
+            <a:pPr marL="0" indent="0">
+              <a:buNone/>
+            </a:pPr>
+            <a:endParaRPr lang="en-US" sz="2000" dirty="0"/>
+          </a:p>
+          <a:p>
+            <a:pPr marL="0" indent="0">
+              <a:buNone/>
+            </a:pPr>
+            <a:endParaRPr lang="en-US" sz="2000" dirty="0"/>
+          </a:p>
+          <a:p>
+            <a:pPr marL="0" indent="0">
+              <a:buNone/>
+            </a:pPr>
+            <a:endParaRPr lang="en-US" sz="2000" dirty="0"/>
+          </a:p>
+          <a:p>
+            <a:pPr marL="0" indent="0">
+              <a:buNone/>
+            </a:pPr>
+            <a:endParaRPr lang="en-US" sz="2000" dirty="0"/>
+          </a:p>
+        </p:txBody>
+      </p:sp>
+      <p:pic>
+        <p:nvPicPr>
+          <p:cNvPr id="2050" name="Picture 1" descr="Incorrect">
+            <a:extLst>
+              <a:ext uri="{FF2B5EF4-FFF2-40B4-BE49-F238E27FC236}">
+                <a16:creationId xmlns:a16="http://schemas.microsoft.com/office/drawing/2014/main" id="{FF58184F-9DBB-46F2-9AD1-5DD64E112630}"/>
+              </a:ext>
+            </a:extLst>
+          </p:cNvPr>
+          <p:cNvPicPr>
+            <a:picLocks noChangeAspect="1" noChangeArrowheads="1"/>
+          </p:cNvPicPr>
+          <p:nvPr/>
+        </p:nvPicPr>
+        <p:blipFill>
+          <a:blip r:embed="rId3">
+            <a:extLst>
+              <a:ext uri="{28A0092B-C50C-407E-A947-70E740481C1C}">
+                <a14:useLocalDpi xmlns:a14="http://schemas.microsoft.com/office/drawing/2010/main" val="0"/>
+              </a:ext>
+            </a:extLst>
+          </a:blip>
+          <a:srcRect/>
+          <a:stretch>
+            <a:fillRect/>
+          </a:stretch>
+        </p:blipFill>
+        <p:spPr bwMode="auto">
+          <a:xfrm>
+            <a:off x="0" y="0"/>
+            <a:ext cx="133350" cy="133350"/>
+          </a:xfrm>
+          <a:prstGeom prst="rect">
+            <a:avLst/>
+          </a:prstGeom>
+          <a:noFill/>
+          <a:extLst>
+            <a:ext uri="{909E8E84-426E-40DD-AFC4-6F175D3DCCD1}">
+              <a14:hiddenFill xmlns:a14="http://schemas.microsoft.com/office/drawing/2010/main">
+                <a:solidFill>
+                  <a:srgbClr val="FFFFFF"/>
+                </a:solidFill>
+              </a14:hiddenFill>
+            </a:ext>
+          </a:extLst>
+        </p:spPr>
+      </p:pic>
+      <p:pic>
+        <p:nvPicPr>
+          <p:cNvPr id="2051" name="Picture 2" descr="check">
+            <a:extLst>
+              <a:ext uri="{FF2B5EF4-FFF2-40B4-BE49-F238E27FC236}">
+                <a16:creationId xmlns:a16="http://schemas.microsoft.com/office/drawing/2014/main" id="{78300109-7A83-4484-8401-B9245A233358}"/>
+              </a:ext>
+            </a:extLst>
+          </p:cNvPr>
+          <p:cNvPicPr>
+            <a:picLocks noChangeAspect="1" noChangeArrowheads="1"/>
+          </p:cNvPicPr>
+          <p:nvPr/>
+        </p:nvPicPr>
+        <p:blipFill>
+          <a:blip r:embed="rId4">
+            <a:extLst>
+              <a:ext uri="{28A0092B-C50C-407E-A947-70E740481C1C}">
+                <a14:useLocalDpi xmlns:a14="http://schemas.microsoft.com/office/drawing/2010/main" val="0"/>
+              </a:ext>
+            </a:extLst>
+          </a:blip>
+          <a:srcRect/>
+          <a:stretch>
+            <a:fillRect/>
+          </a:stretch>
+        </p:blipFill>
+        <p:spPr bwMode="auto">
+          <a:xfrm>
+            <a:off x="0" y="0"/>
+            <a:ext cx="133350" cy="133350"/>
+          </a:xfrm>
+          <a:prstGeom prst="rect">
+            <a:avLst/>
+          </a:prstGeom>
+          <a:noFill/>
+          <a:extLst>
+            <a:ext uri="{909E8E84-426E-40DD-AFC4-6F175D3DCCD1}">
+              <a14:hiddenFill xmlns:a14="http://schemas.microsoft.com/office/drawing/2010/main">
+                <a:solidFill>
+                  <a:srgbClr val="FFFFFF"/>
+                </a:solidFill>
+              </a14:hiddenFill>
+            </a:ext>
+          </a:extLst>
+        </p:spPr>
+      </p:pic>
+    </p:spTree>
+    <p:extLst>
+      <p:ext uri="{BB962C8B-B14F-4D97-AF65-F5344CB8AC3E}">
+        <p14:creationId xmlns:p14="http://schemas.microsoft.com/office/powerpoint/2010/main" val="2642818570"/>
+      </p:ext>
+    </p:extLst>
+  </p:cSld>
+  <p:clrMapOvr>
+    <a:masterClrMapping/>
+  </p:clrMapOvr>
+</p:sld>
+</file>
+
+<file path=ppt/slides/slide16.xml><?xml version="1.0" encoding="utf-8"?>
+<p:sld xmlns:a="http://schemas.openxmlformats.org/drawingml/2006/main" xmlns:r="http://schemas.openxmlformats.org/officeDocument/2006/relationships" xmlns:p="http://schemas.openxmlformats.org/presentationml/2006/main">
+  <p:cSld>
+    <p:spTree>
+      <p:nvGrpSpPr>
+        <p:cNvPr id="1" name=""/>
+        <p:cNvGrpSpPr/>
+        <p:nvPr/>
+      </p:nvGrpSpPr>
+      <p:grpSpPr>
+        <a:xfrm>
+          <a:off x="0" y="0"/>
+          <a:ext cx="0" cy="0"/>
+          <a:chOff x="0" y="0"/>
+          <a:chExt cx="0" cy="0"/>
+        </a:xfrm>
+      </p:grpSpPr>
+      <p:sp>
+        <p:nvSpPr>
+          <p:cNvPr id="4" name="Title 1">
+            <a:extLst>
+              <a:ext uri="{FF2B5EF4-FFF2-40B4-BE49-F238E27FC236}">
+                <a16:creationId xmlns:a16="http://schemas.microsoft.com/office/drawing/2014/main" id="{527CE47F-3EF6-48CA-9239-E8B6E5C6B41A}"/>
+              </a:ext>
+            </a:extLst>
+          </p:cNvPr>
+          <p:cNvSpPr>
+            <a:spLocks noGrp="1"/>
+          </p:cNvSpPr>
+          <p:nvPr>
+            <p:ph type="title"/>
+          </p:nvPr>
+        </p:nvSpPr>
+        <p:spPr>
+          <a:xfrm>
+            <a:off x="838200" y="365125"/>
+            <a:ext cx="10515600" cy="1325563"/>
+          </a:xfrm>
+        </p:spPr>
+        <p:txBody>
+          <a:bodyPr>
+            <a:normAutofit/>
+          </a:bodyPr>
+          <a:lstStyle/>
+          <a:p>
+            <a:r>
+              <a:rPr lang="en-US" sz="3600" dirty="0"/>
+              <a:t>Add Tutorial Code for a Map and Markers</a:t>
+            </a:r>
+          </a:p>
+        </p:txBody>
+      </p:sp>
+      <p:sp>
+        <p:nvSpPr>
+          <p:cNvPr id="5" name="Content Placeholder 2">
+            <a:extLst>
+              <a:ext uri="{FF2B5EF4-FFF2-40B4-BE49-F238E27FC236}">
+                <a16:creationId xmlns:a16="http://schemas.microsoft.com/office/drawing/2014/main" id="{E8F0EA9A-219C-40FD-AE36-784EE1B77D56}"/>
+              </a:ext>
+            </a:extLst>
+          </p:cNvPr>
+          <p:cNvSpPr>
+            <a:spLocks noGrp="1"/>
+          </p:cNvSpPr>
+          <p:nvPr>
+            <p:ph idx="1"/>
+          </p:nvPr>
+        </p:nvSpPr>
+        <p:spPr>
+          <a:xfrm>
+            <a:off x="838198" y="1525772"/>
+            <a:ext cx="10515601" cy="4651191"/>
+          </a:xfrm>
+        </p:spPr>
+        <p:txBody>
+          <a:bodyPr>
+            <a:normAutofit/>
+          </a:bodyPr>
+          <a:lstStyle/>
+          <a:p>
+            <a:pPr marL="0" indent="0">
+              <a:buNone/>
+            </a:pPr>
+            <a:r>
+              <a:rPr lang="en-US" sz="2000" dirty="0"/>
+              <a:t>Step 2 – Add a Google Map and two Markers: </a:t>
+            </a:r>
+          </a:p>
+          <a:p>
+            <a:pPr marL="457200" indent="-457200">
+              <a:buFont typeface="+mj-lt"/>
+              <a:buAutoNum type="arabicPeriod"/>
+            </a:pPr>
+            <a:r>
+              <a:rPr lang="en-US" sz="2000" dirty="0"/>
+              <a:t>Copy all three ‘step-01’ files to ‘step-02’ html, </a:t>
+            </a:r>
+            <a:r>
+              <a:rPr lang="en-US" sz="2000" dirty="0" err="1"/>
+              <a:t>css</a:t>
+            </a:r>
+            <a:r>
+              <a:rPr lang="en-US" sz="2000" dirty="0"/>
+              <a:t>, and </a:t>
+            </a:r>
+            <a:r>
+              <a:rPr lang="en-US" sz="2000" dirty="0" err="1"/>
+              <a:t>js</a:t>
+            </a:r>
+            <a:r>
+              <a:rPr lang="en-US" sz="2000" dirty="0"/>
+              <a:t> files</a:t>
+            </a:r>
+          </a:p>
+          <a:p>
+            <a:pPr marL="457200" indent="-457200">
+              <a:buFont typeface="+mj-lt"/>
+              <a:buAutoNum type="arabicPeriod"/>
+            </a:pPr>
+            <a:r>
+              <a:rPr lang="en-US" sz="2000" dirty="0"/>
+              <a:t>Update links in ‘google-maps-step-02.html’ to reflect new names</a:t>
+            </a:r>
+          </a:p>
+          <a:p>
+            <a:pPr marL="457200" indent="-457200">
+              <a:buFont typeface="+mj-lt"/>
+              <a:buAutoNum type="arabicPeriod"/>
+            </a:pPr>
+            <a:r>
+              <a:rPr lang="en-US" sz="2000" dirty="0"/>
+              <a:t>Update ‘console.log()’ message to reflect ‘Step 2’ and test new files… does it work? </a:t>
+            </a:r>
+          </a:p>
+          <a:p>
+            <a:pPr marL="457200" indent="-457200">
+              <a:buFont typeface="+mj-lt"/>
+              <a:buAutoNum type="arabicPeriod"/>
+            </a:pPr>
+            <a:r>
+              <a:rPr lang="en-US" sz="2000" dirty="0"/>
+              <a:t>Now add code from Google Maps tutorial to Step 2 files</a:t>
+            </a:r>
+          </a:p>
+          <a:p>
+            <a:pPr marL="457200" indent="-457200">
+              <a:buFont typeface="+mj-lt"/>
+              <a:buAutoNum type="arabicPeriod"/>
+            </a:pPr>
+            <a:r>
+              <a:rPr lang="en-US" sz="2000" dirty="0"/>
+              <a:t>Test it!... does it work? </a:t>
+            </a:r>
+          </a:p>
+          <a:p>
+            <a:pPr marL="457200" indent="-457200">
+              <a:buFont typeface="+mj-lt"/>
+              <a:buAutoNum type="arabicPeriod"/>
+            </a:pPr>
+            <a:r>
+              <a:rPr lang="en-US" sz="2000" dirty="0"/>
+              <a:t>Add a marker like they did in the second tutorial… does it work? </a:t>
+            </a:r>
+          </a:p>
+          <a:p>
+            <a:pPr marL="457200" indent="-457200">
+              <a:buFont typeface="+mj-lt"/>
+              <a:buAutoNum type="arabicPeriod"/>
+            </a:pPr>
+            <a:r>
+              <a:rPr lang="en-US" sz="2000" dirty="0"/>
+              <a:t>Add a second marker with a custom icon and Listener… does it work? </a:t>
+            </a:r>
+          </a:p>
+          <a:p>
+            <a:pPr marL="457200" indent="-457200">
+              <a:buFont typeface="+mj-lt"/>
+              <a:buAutoNum type="arabicPeriod"/>
+            </a:pPr>
+            <a:r>
+              <a:rPr lang="en-US" sz="2000" dirty="0"/>
+              <a:t>Success!</a:t>
+            </a:r>
+          </a:p>
+          <a:p>
+            <a:pPr marL="457200" indent="-457200">
+              <a:buFont typeface="+mj-lt"/>
+              <a:buAutoNum type="arabicPeriod"/>
+            </a:pPr>
+            <a:endParaRPr lang="en-US" sz="2000" dirty="0"/>
+          </a:p>
+          <a:p>
+            <a:pPr marL="457200" indent="-457200">
+              <a:buFont typeface="+mj-lt"/>
+              <a:buAutoNum type="arabicPeriod"/>
+            </a:pPr>
+            <a:r>
+              <a:rPr lang="en-US" sz="2000" dirty="0"/>
+              <a:t>Time check…</a:t>
+            </a:r>
+          </a:p>
+          <a:p>
+            <a:pPr marL="0" indent="0">
+              <a:buNone/>
+            </a:pPr>
+            <a:endParaRPr lang="en-US" sz="2000" dirty="0"/>
+          </a:p>
+          <a:p>
+            <a:pPr marL="457200" indent="-457200">
+              <a:buFont typeface="+mj-lt"/>
+              <a:buAutoNum type="arabicPeriod"/>
+            </a:pPr>
+            <a:endParaRPr lang="en-US" sz="2000" dirty="0"/>
+          </a:p>
+          <a:p>
+            <a:pPr marL="457200" indent="-457200">
+              <a:buFont typeface="+mj-lt"/>
+              <a:buAutoNum type="arabicPeriod"/>
+            </a:pPr>
+            <a:endParaRPr lang="en-US" sz="2000" dirty="0"/>
+          </a:p>
+          <a:p>
+            <a:endParaRPr lang="en-US" sz="2000" dirty="0"/>
+          </a:p>
+          <a:p>
+            <a:pPr marL="0" indent="0">
+              <a:buNone/>
+            </a:pPr>
+            <a:endParaRPr lang="en-US" sz="2000" dirty="0"/>
+          </a:p>
+          <a:p>
+            <a:pPr marL="0" indent="0">
+              <a:buNone/>
+            </a:pPr>
+            <a:endParaRPr lang="en-US" sz="2000" dirty="0"/>
+          </a:p>
+          <a:p>
+            <a:pPr marL="0" indent="0">
+              <a:buNone/>
+            </a:pPr>
+            <a:endParaRPr lang="en-US" sz="2000" dirty="0"/>
+          </a:p>
+          <a:p>
+            <a:pPr marL="0" indent="0">
+              <a:buNone/>
+            </a:pPr>
+            <a:endParaRPr lang="en-US" sz="2000" dirty="0"/>
+          </a:p>
+          <a:p>
+            <a:pPr marL="0" indent="0">
+              <a:buNone/>
+            </a:pPr>
+            <a:endParaRPr lang="en-US" sz="2000" dirty="0"/>
+          </a:p>
+        </p:txBody>
+      </p:sp>
+      <p:pic>
+        <p:nvPicPr>
+          <p:cNvPr id="2050" name="Picture 1" descr="Incorrect">
+            <a:extLst>
+              <a:ext uri="{FF2B5EF4-FFF2-40B4-BE49-F238E27FC236}">
+                <a16:creationId xmlns:a16="http://schemas.microsoft.com/office/drawing/2014/main" id="{FF58184F-9DBB-46F2-9AD1-5DD64E112630}"/>
+              </a:ext>
+            </a:extLst>
+          </p:cNvPr>
+          <p:cNvPicPr>
+            <a:picLocks noChangeAspect="1" noChangeArrowheads="1"/>
+          </p:cNvPicPr>
+          <p:nvPr/>
+        </p:nvPicPr>
+        <p:blipFill>
+          <a:blip r:embed="rId3">
+            <a:extLst>
+              <a:ext uri="{28A0092B-C50C-407E-A947-70E740481C1C}">
+                <a14:useLocalDpi xmlns:a14="http://schemas.microsoft.com/office/drawing/2010/main" val="0"/>
+              </a:ext>
+            </a:extLst>
+          </a:blip>
+          <a:srcRect/>
+          <a:stretch>
+            <a:fillRect/>
+          </a:stretch>
+        </p:blipFill>
+        <p:spPr bwMode="auto">
+          <a:xfrm>
+            <a:off x="0" y="0"/>
+            <a:ext cx="133350" cy="133350"/>
+          </a:xfrm>
+          <a:prstGeom prst="rect">
+            <a:avLst/>
+          </a:prstGeom>
+          <a:noFill/>
+          <a:extLst>
+            <a:ext uri="{909E8E84-426E-40DD-AFC4-6F175D3DCCD1}">
+              <a14:hiddenFill xmlns:a14="http://schemas.microsoft.com/office/drawing/2010/main">
+                <a:solidFill>
+                  <a:srgbClr val="FFFFFF"/>
+                </a:solidFill>
+              </a14:hiddenFill>
+            </a:ext>
+          </a:extLst>
+        </p:spPr>
+      </p:pic>
+      <p:pic>
+        <p:nvPicPr>
+          <p:cNvPr id="2051" name="Picture 2" descr="check">
+            <a:extLst>
+              <a:ext uri="{FF2B5EF4-FFF2-40B4-BE49-F238E27FC236}">
+                <a16:creationId xmlns:a16="http://schemas.microsoft.com/office/drawing/2014/main" id="{78300109-7A83-4484-8401-B9245A233358}"/>
+              </a:ext>
+            </a:extLst>
+          </p:cNvPr>
+          <p:cNvPicPr>
+            <a:picLocks noChangeAspect="1" noChangeArrowheads="1"/>
+          </p:cNvPicPr>
+          <p:nvPr/>
+        </p:nvPicPr>
+        <p:blipFill>
+          <a:blip r:embed="rId4">
+            <a:extLst>
+              <a:ext uri="{28A0092B-C50C-407E-A947-70E740481C1C}">
+                <a14:useLocalDpi xmlns:a14="http://schemas.microsoft.com/office/drawing/2010/main" val="0"/>
+              </a:ext>
+            </a:extLst>
+          </a:blip>
+          <a:srcRect/>
+          <a:stretch>
+            <a:fillRect/>
+          </a:stretch>
+        </p:blipFill>
+        <p:spPr bwMode="auto">
+          <a:xfrm>
+            <a:off x="0" y="0"/>
+            <a:ext cx="133350" cy="133350"/>
+          </a:xfrm>
+          <a:prstGeom prst="rect">
+            <a:avLst/>
+          </a:prstGeom>
+          <a:noFill/>
+          <a:extLst>
+            <a:ext uri="{909E8E84-426E-40DD-AFC4-6F175D3DCCD1}">
+              <a14:hiddenFill xmlns:a14="http://schemas.microsoft.com/office/drawing/2010/main">
+                <a:solidFill>
+                  <a:srgbClr val="FFFFFF"/>
+                </a:solidFill>
+              </a14:hiddenFill>
+            </a:ext>
+          </a:extLst>
+        </p:spPr>
+      </p:pic>
+    </p:spTree>
+    <p:extLst>
+      <p:ext uri="{BB962C8B-B14F-4D97-AF65-F5344CB8AC3E}">
+        <p14:creationId xmlns:p14="http://schemas.microsoft.com/office/powerpoint/2010/main" val="2237872720"/>
+      </p:ext>
+    </p:extLst>
+  </p:cSld>
+  <p:clrMapOvr>
+    <a:masterClrMapping/>
+  </p:clrMapOvr>
+</p:sld>
+</file>
+
+<file path=ppt/slides/slide17.xml><?xml version="1.0" encoding="utf-8"?>
+<p:sld xmlns:a="http://schemas.openxmlformats.org/drawingml/2006/main" xmlns:r="http://schemas.openxmlformats.org/officeDocument/2006/relationships" xmlns:p="http://schemas.openxmlformats.org/presentationml/2006/main">
+  <p:cSld>
+    <p:spTree>
+      <p:nvGrpSpPr>
+        <p:cNvPr id="1" name=""/>
+        <p:cNvGrpSpPr/>
+        <p:nvPr/>
+      </p:nvGrpSpPr>
+      <p:grpSpPr>
+        <a:xfrm>
+          <a:off x="0" y="0"/>
+          <a:ext cx="0" cy="0"/>
+          <a:chOff x="0" y="0"/>
+          <a:chExt cx="0" cy="0"/>
+        </a:xfrm>
+      </p:grpSpPr>
+      <p:sp>
+        <p:nvSpPr>
+          <p:cNvPr id="4" name="Title 1">
+            <a:extLst>
+              <a:ext uri="{FF2B5EF4-FFF2-40B4-BE49-F238E27FC236}">
+                <a16:creationId xmlns:a16="http://schemas.microsoft.com/office/drawing/2014/main" id="{527CE47F-3EF6-48CA-9239-E8B6E5C6B41A}"/>
+              </a:ext>
+            </a:extLst>
+          </p:cNvPr>
+          <p:cNvSpPr>
+            <a:spLocks noGrp="1"/>
+          </p:cNvSpPr>
+          <p:nvPr>
+            <p:ph type="title"/>
+          </p:nvPr>
+        </p:nvSpPr>
+        <p:spPr>
+          <a:xfrm>
+            <a:off x="838200" y="365125"/>
+            <a:ext cx="10515600" cy="1325563"/>
+          </a:xfrm>
+        </p:spPr>
+        <p:txBody>
+          <a:bodyPr>
+            <a:normAutofit/>
+          </a:bodyPr>
+          <a:lstStyle/>
+          <a:p>
+            <a:r>
+              <a:rPr lang="en-US" sz="3600" dirty="0"/>
+              <a:t>Add Idle Listener that Checks </a:t>
+            </a:r>
+            <a:r>
+              <a:rPr lang="en-US" sz="3600" dirty="0" err="1"/>
+              <a:t>Zoomlevel</a:t>
+            </a:r>
+            <a:r>
+              <a:rPr lang="en-US" sz="3600" dirty="0"/>
+              <a:t> and Bounds</a:t>
+            </a:r>
+          </a:p>
+        </p:txBody>
+      </p:sp>
+      <p:sp>
+        <p:nvSpPr>
+          <p:cNvPr id="5" name="Content Placeholder 2">
+            <a:extLst>
+              <a:ext uri="{FF2B5EF4-FFF2-40B4-BE49-F238E27FC236}">
+                <a16:creationId xmlns:a16="http://schemas.microsoft.com/office/drawing/2014/main" id="{E8F0EA9A-219C-40FD-AE36-784EE1B77D56}"/>
+              </a:ext>
+            </a:extLst>
+          </p:cNvPr>
+          <p:cNvSpPr>
+            <a:spLocks noGrp="1"/>
+          </p:cNvSpPr>
+          <p:nvPr>
+            <p:ph idx="1"/>
+          </p:nvPr>
+        </p:nvSpPr>
+        <p:spPr>
+          <a:xfrm>
+            <a:off x="838198" y="1525772"/>
+            <a:ext cx="10515601" cy="4651191"/>
+          </a:xfrm>
+        </p:spPr>
+        <p:txBody>
+          <a:bodyPr>
+            <a:normAutofit/>
+          </a:bodyPr>
+          <a:lstStyle/>
+          <a:p>
+            <a:pPr marL="0" indent="0">
+              <a:buNone/>
+            </a:pPr>
+            <a:r>
+              <a:rPr lang="en-US" sz="2000" dirty="0"/>
+              <a:t>Step 3 – Add Listener for Idle, get zoom level, check bounds, and remove Yahtzee code: </a:t>
+            </a:r>
+          </a:p>
+          <a:p>
+            <a:pPr marL="457200" indent="-457200">
+              <a:buFont typeface="+mj-lt"/>
+              <a:buAutoNum type="arabicPeriod"/>
+            </a:pPr>
+            <a:r>
+              <a:rPr lang="en-US" sz="2000" dirty="0"/>
+              <a:t>Copy all three ‘step-02’ files to ‘step-03’ html, </a:t>
+            </a:r>
+            <a:r>
+              <a:rPr lang="en-US" sz="2000" dirty="0" err="1"/>
+              <a:t>css</a:t>
+            </a:r>
+            <a:r>
+              <a:rPr lang="en-US" sz="2000" dirty="0"/>
+              <a:t>, and </a:t>
+            </a:r>
+            <a:r>
+              <a:rPr lang="en-US" sz="2000" dirty="0" err="1"/>
+              <a:t>js</a:t>
+            </a:r>
+            <a:r>
+              <a:rPr lang="en-US" sz="2000" dirty="0"/>
+              <a:t> files</a:t>
+            </a:r>
+          </a:p>
+          <a:p>
+            <a:pPr marL="457200" indent="-457200">
+              <a:buFont typeface="+mj-lt"/>
+              <a:buAutoNum type="arabicPeriod"/>
+            </a:pPr>
+            <a:r>
+              <a:rPr lang="en-US" sz="2000" dirty="0"/>
+              <a:t>Update links in ‘google-maps-step-03.html’ to reflect new names</a:t>
+            </a:r>
+          </a:p>
+          <a:p>
+            <a:pPr marL="457200" indent="-457200">
+              <a:buFont typeface="+mj-lt"/>
+              <a:buAutoNum type="arabicPeriod"/>
+            </a:pPr>
+            <a:r>
+              <a:rPr lang="en-US" sz="2000" dirty="0"/>
+              <a:t>Update ‘console.log()’ message to reflect ‘Step 3’ and test new files… does it work? </a:t>
+            </a:r>
+          </a:p>
+          <a:p>
+            <a:pPr marL="457200" indent="-457200">
+              <a:buFont typeface="+mj-lt"/>
+              <a:buAutoNum type="arabicPeriod"/>
+            </a:pPr>
+            <a:r>
+              <a:rPr lang="en-US" sz="2000" dirty="0"/>
+              <a:t>Add a listener for Idle that logs a console message with the current zoom level… does it work?</a:t>
+            </a:r>
+          </a:p>
+          <a:p>
+            <a:pPr marL="457200" indent="-457200">
+              <a:buFont typeface="+mj-lt"/>
+              <a:buAutoNum type="arabicPeriod"/>
+            </a:pPr>
+            <a:r>
+              <a:rPr lang="en-US" sz="2000" dirty="0"/>
+              <a:t>Success!</a:t>
+            </a:r>
+          </a:p>
+          <a:p>
+            <a:pPr marL="457200" indent="-457200">
+              <a:buFont typeface="+mj-lt"/>
+              <a:buAutoNum type="arabicPeriod"/>
+            </a:pPr>
+            <a:endParaRPr lang="en-US" sz="2000" dirty="0"/>
+          </a:p>
+          <a:p>
+            <a:pPr marL="457200" indent="-457200">
+              <a:buFont typeface="+mj-lt"/>
+              <a:buAutoNum type="arabicPeriod"/>
+            </a:pPr>
+            <a:endParaRPr lang="en-US" sz="2000" dirty="0"/>
+          </a:p>
+          <a:p>
+            <a:endParaRPr lang="en-US" sz="2000" dirty="0"/>
+          </a:p>
+          <a:p>
+            <a:pPr marL="0" indent="0">
+              <a:buNone/>
+            </a:pPr>
+            <a:endParaRPr lang="en-US" sz="2000" dirty="0"/>
+          </a:p>
+          <a:p>
+            <a:pPr marL="0" indent="0">
+              <a:buNone/>
+            </a:pPr>
+            <a:endParaRPr lang="en-US" sz="2000" dirty="0"/>
+          </a:p>
+          <a:p>
+            <a:pPr marL="0" indent="0">
+              <a:buNone/>
+            </a:pPr>
+            <a:endParaRPr lang="en-US" sz="2000" dirty="0"/>
+          </a:p>
+          <a:p>
+            <a:pPr marL="0" indent="0">
+              <a:buNone/>
+            </a:pPr>
+            <a:endParaRPr lang="en-US" sz="2000" dirty="0"/>
+          </a:p>
+          <a:p>
+            <a:pPr marL="0" indent="0">
+              <a:buNone/>
+            </a:pPr>
+            <a:endParaRPr lang="en-US" sz="2000" dirty="0"/>
+          </a:p>
+        </p:txBody>
+      </p:sp>
+      <p:pic>
+        <p:nvPicPr>
+          <p:cNvPr id="2050" name="Picture 1" descr="Incorrect">
+            <a:extLst>
+              <a:ext uri="{FF2B5EF4-FFF2-40B4-BE49-F238E27FC236}">
+                <a16:creationId xmlns:a16="http://schemas.microsoft.com/office/drawing/2014/main" id="{FF58184F-9DBB-46F2-9AD1-5DD64E112630}"/>
+              </a:ext>
+            </a:extLst>
+          </p:cNvPr>
+          <p:cNvPicPr>
+            <a:picLocks noChangeAspect="1" noChangeArrowheads="1"/>
+          </p:cNvPicPr>
+          <p:nvPr/>
+        </p:nvPicPr>
+        <p:blipFill>
+          <a:blip r:embed="rId3">
+            <a:extLst>
+              <a:ext uri="{28A0092B-C50C-407E-A947-70E740481C1C}">
+                <a14:useLocalDpi xmlns:a14="http://schemas.microsoft.com/office/drawing/2010/main" val="0"/>
+              </a:ext>
+            </a:extLst>
+          </a:blip>
+          <a:srcRect/>
+          <a:stretch>
+            <a:fillRect/>
+          </a:stretch>
+        </p:blipFill>
+        <p:spPr bwMode="auto">
+          <a:xfrm>
+            <a:off x="0" y="0"/>
+            <a:ext cx="133350" cy="133350"/>
+          </a:xfrm>
+          <a:prstGeom prst="rect">
+            <a:avLst/>
+          </a:prstGeom>
+          <a:noFill/>
+          <a:extLst>
+            <a:ext uri="{909E8E84-426E-40DD-AFC4-6F175D3DCCD1}">
+              <a14:hiddenFill xmlns:a14="http://schemas.microsoft.com/office/drawing/2010/main">
+                <a:solidFill>
+                  <a:srgbClr val="FFFFFF"/>
+                </a:solidFill>
+              </a14:hiddenFill>
+            </a:ext>
+          </a:extLst>
+        </p:spPr>
+      </p:pic>
+      <p:pic>
+        <p:nvPicPr>
+          <p:cNvPr id="2051" name="Picture 2" descr="check">
+            <a:extLst>
+              <a:ext uri="{FF2B5EF4-FFF2-40B4-BE49-F238E27FC236}">
+                <a16:creationId xmlns:a16="http://schemas.microsoft.com/office/drawing/2014/main" id="{78300109-7A83-4484-8401-B9245A233358}"/>
+              </a:ext>
+            </a:extLst>
+          </p:cNvPr>
+          <p:cNvPicPr>
+            <a:picLocks noChangeAspect="1" noChangeArrowheads="1"/>
+          </p:cNvPicPr>
+          <p:nvPr/>
+        </p:nvPicPr>
+        <p:blipFill>
+          <a:blip r:embed="rId4">
+            <a:extLst>
+              <a:ext uri="{28A0092B-C50C-407E-A947-70E740481C1C}">
+                <a14:useLocalDpi xmlns:a14="http://schemas.microsoft.com/office/drawing/2010/main" val="0"/>
+              </a:ext>
+            </a:extLst>
+          </a:blip>
+          <a:srcRect/>
+          <a:stretch>
+            <a:fillRect/>
+          </a:stretch>
+        </p:blipFill>
+        <p:spPr bwMode="auto">
+          <a:xfrm>
+            <a:off x="0" y="0"/>
+            <a:ext cx="133350" cy="133350"/>
+          </a:xfrm>
+          <a:prstGeom prst="rect">
+            <a:avLst/>
+          </a:prstGeom>
+          <a:noFill/>
+          <a:extLst>
+            <a:ext uri="{909E8E84-426E-40DD-AFC4-6F175D3DCCD1}">
+              <a14:hiddenFill xmlns:a14="http://schemas.microsoft.com/office/drawing/2010/main">
+                <a:solidFill>
+                  <a:srgbClr val="FFFFFF"/>
+                </a:solidFill>
+              </a14:hiddenFill>
+            </a:ext>
+          </a:extLst>
+        </p:spPr>
+      </p:pic>
+    </p:spTree>
+    <p:extLst>
+      <p:ext uri="{BB962C8B-B14F-4D97-AF65-F5344CB8AC3E}">
+        <p14:creationId xmlns:p14="http://schemas.microsoft.com/office/powerpoint/2010/main" val="1018001874"/>
+      </p:ext>
+    </p:extLst>
+  </p:cSld>
+  <p:clrMapOvr>
+    <a:masterClrMapping/>
+  </p:clrMapOvr>
+</p:sld>
+</file>
+
+<file path=ppt/slides/slide18.xml><?xml version="1.0" encoding="utf-8"?>
+<p:sld xmlns:a="http://schemas.openxmlformats.org/drawingml/2006/main" xmlns:r="http://schemas.openxmlformats.org/officeDocument/2006/relationships" xmlns:p="http://schemas.openxmlformats.org/presentationml/2006/main">
+  <p:cSld>
+    <p:spTree>
+      <p:nvGrpSpPr>
+        <p:cNvPr id="1" name=""/>
+        <p:cNvGrpSpPr/>
+        <p:nvPr/>
+      </p:nvGrpSpPr>
+      <p:grpSpPr>
+        <a:xfrm>
+          <a:off x="0" y="0"/>
+          <a:ext cx="0" cy="0"/>
+          <a:chOff x="0" y="0"/>
+          <a:chExt cx="0" cy="0"/>
+        </a:xfrm>
+      </p:grpSpPr>
+      <p:sp>
+        <p:nvSpPr>
+          <p:cNvPr id="4" name="Title 1">
+            <a:extLst>
+              <a:ext uri="{FF2B5EF4-FFF2-40B4-BE49-F238E27FC236}">
+                <a16:creationId xmlns:a16="http://schemas.microsoft.com/office/drawing/2014/main" id="{527CE47F-3EF6-48CA-9239-E8B6E5C6B41A}"/>
+              </a:ext>
+            </a:extLst>
+          </p:cNvPr>
+          <p:cNvSpPr>
+            <a:spLocks noGrp="1"/>
+          </p:cNvSpPr>
+          <p:nvPr>
+            <p:ph type="title"/>
+          </p:nvPr>
+        </p:nvSpPr>
+        <p:spPr>
+          <a:xfrm>
+            <a:off x="838200" y="365125"/>
+            <a:ext cx="10515600" cy="1325563"/>
+          </a:xfrm>
+        </p:spPr>
+        <p:txBody>
+          <a:bodyPr>
+            <a:normAutofit/>
+          </a:bodyPr>
+          <a:lstStyle/>
+          <a:p>
+            <a:r>
+              <a:rPr lang="en-US" sz="3600" dirty="0"/>
+              <a:t>Remove or Repurpose Yahtzee Code</a:t>
+            </a:r>
+          </a:p>
+        </p:txBody>
+      </p:sp>
+      <p:sp>
+        <p:nvSpPr>
+          <p:cNvPr id="5" name="Content Placeholder 2">
+            <a:extLst>
+              <a:ext uri="{FF2B5EF4-FFF2-40B4-BE49-F238E27FC236}">
+                <a16:creationId xmlns:a16="http://schemas.microsoft.com/office/drawing/2014/main" id="{E8F0EA9A-219C-40FD-AE36-784EE1B77D56}"/>
+              </a:ext>
+            </a:extLst>
+          </p:cNvPr>
+          <p:cNvSpPr>
+            <a:spLocks noGrp="1"/>
+          </p:cNvSpPr>
+          <p:nvPr>
+            <p:ph idx="1"/>
+          </p:nvPr>
+        </p:nvSpPr>
+        <p:spPr>
+          <a:xfrm>
+            <a:off x="838198" y="1525772"/>
+            <a:ext cx="10515601" cy="4651191"/>
+          </a:xfrm>
+        </p:spPr>
+        <p:txBody>
+          <a:bodyPr>
+            <a:normAutofit/>
+          </a:bodyPr>
+          <a:lstStyle/>
+          <a:p>
+            <a:pPr marL="0" indent="0">
+              <a:buNone/>
+            </a:pPr>
+            <a:r>
+              <a:rPr lang="en-US" sz="2000" dirty="0"/>
+              <a:t>Step 4 – Create step 4 files and know what you will need to do to submit project: </a:t>
+            </a:r>
+          </a:p>
+          <a:p>
+            <a:pPr marL="457200" indent="-457200">
+              <a:buFont typeface="+mj-lt"/>
+              <a:buAutoNum type="arabicPeriod"/>
+            </a:pPr>
+            <a:r>
+              <a:rPr lang="en-US" sz="2000" dirty="0"/>
+              <a:t>Copy all three ‘step-03’ files to ‘step-04’ html, </a:t>
+            </a:r>
+            <a:r>
+              <a:rPr lang="en-US" sz="2000" dirty="0" err="1"/>
+              <a:t>css</a:t>
+            </a:r>
+            <a:r>
+              <a:rPr lang="en-US" sz="2000" dirty="0"/>
+              <a:t>, and </a:t>
+            </a:r>
+            <a:r>
+              <a:rPr lang="en-US" sz="2000" dirty="0" err="1"/>
+              <a:t>js</a:t>
+            </a:r>
+            <a:r>
+              <a:rPr lang="en-US" sz="2000" dirty="0"/>
+              <a:t> files</a:t>
+            </a:r>
+          </a:p>
+          <a:p>
+            <a:pPr marL="457200" indent="-457200">
+              <a:buFont typeface="+mj-lt"/>
+              <a:buAutoNum type="arabicPeriod"/>
+            </a:pPr>
+            <a:r>
+              <a:rPr lang="en-US" sz="2000" dirty="0"/>
+              <a:t>Remove/repurpose Yahtzee code to create Instructions and Hints… does it work? </a:t>
+            </a:r>
+          </a:p>
+          <a:p>
+            <a:pPr marL="457200" indent="-457200">
+              <a:buFont typeface="+mj-lt"/>
+              <a:buAutoNum type="arabicPeriod"/>
+            </a:pPr>
+            <a:r>
+              <a:rPr lang="en-US" sz="2000" dirty="0"/>
+              <a:t>If you want, you can utilize ‘step-04’ to continue enhancing your solution</a:t>
+            </a:r>
+          </a:p>
+          <a:p>
+            <a:pPr marL="457200" indent="-457200">
+              <a:buFont typeface="+mj-lt"/>
+              <a:buAutoNum type="arabicPeriod"/>
+            </a:pPr>
+            <a:r>
+              <a:rPr lang="en-US" sz="2000" dirty="0"/>
+              <a:t>Do you know what it would take to finalize and submit ‘step-04’? </a:t>
+            </a:r>
+          </a:p>
+          <a:p>
+            <a:pPr marL="0" indent="0">
+              <a:buNone/>
+            </a:pPr>
+            <a:endParaRPr lang="en-US" sz="2000" dirty="0"/>
+          </a:p>
+          <a:p>
+            <a:pPr marL="457200" indent="-457200">
+              <a:buFont typeface="+mj-lt"/>
+              <a:buAutoNum type="arabicPeriod"/>
+            </a:pPr>
+            <a:endParaRPr lang="en-US" sz="2000" dirty="0"/>
+          </a:p>
+          <a:p>
+            <a:endParaRPr lang="en-US" sz="2000" dirty="0"/>
+          </a:p>
+          <a:p>
+            <a:pPr marL="0" indent="0">
+              <a:buNone/>
+            </a:pPr>
+            <a:endParaRPr lang="en-US" sz="2000" dirty="0"/>
+          </a:p>
+          <a:p>
+            <a:pPr marL="0" indent="0">
+              <a:buNone/>
+            </a:pPr>
+            <a:endParaRPr lang="en-US" sz="2000" dirty="0"/>
+          </a:p>
+          <a:p>
+            <a:pPr marL="0" indent="0">
+              <a:buNone/>
+            </a:pPr>
+            <a:endParaRPr lang="en-US" sz="2000" dirty="0"/>
+          </a:p>
+          <a:p>
+            <a:pPr marL="0" indent="0">
+              <a:buNone/>
+            </a:pPr>
+            <a:endParaRPr lang="en-US" sz="2000" dirty="0"/>
+          </a:p>
+          <a:p>
+            <a:pPr marL="0" indent="0">
+              <a:buNone/>
+            </a:pPr>
+            <a:endParaRPr lang="en-US" sz="2000" dirty="0"/>
+          </a:p>
+        </p:txBody>
+      </p:sp>
+      <p:pic>
+        <p:nvPicPr>
+          <p:cNvPr id="2050" name="Picture 1" descr="Incorrect">
+            <a:extLst>
+              <a:ext uri="{FF2B5EF4-FFF2-40B4-BE49-F238E27FC236}">
+                <a16:creationId xmlns:a16="http://schemas.microsoft.com/office/drawing/2014/main" id="{FF58184F-9DBB-46F2-9AD1-5DD64E112630}"/>
+              </a:ext>
+            </a:extLst>
+          </p:cNvPr>
+          <p:cNvPicPr>
+            <a:picLocks noChangeAspect="1" noChangeArrowheads="1"/>
+          </p:cNvPicPr>
+          <p:nvPr/>
+        </p:nvPicPr>
+        <p:blipFill>
+          <a:blip r:embed="rId3">
+            <a:extLst>
+              <a:ext uri="{28A0092B-C50C-407E-A947-70E740481C1C}">
+                <a14:useLocalDpi xmlns:a14="http://schemas.microsoft.com/office/drawing/2010/main" val="0"/>
+              </a:ext>
+            </a:extLst>
+          </a:blip>
+          <a:srcRect/>
+          <a:stretch>
+            <a:fillRect/>
+          </a:stretch>
+        </p:blipFill>
+        <p:spPr bwMode="auto">
+          <a:xfrm>
+            <a:off x="0" y="0"/>
+            <a:ext cx="133350" cy="133350"/>
+          </a:xfrm>
+          <a:prstGeom prst="rect">
+            <a:avLst/>
+          </a:prstGeom>
+          <a:noFill/>
+          <a:extLst>
+            <a:ext uri="{909E8E84-426E-40DD-AFC4-6F175D3DCCD1}">
+              <a14:hiddenFill xmlns:a14="http://schemas.microsoft.com/office/drawing/2010/main">
+                <a:solidFill>
+                  <a:srgbClr val="FFFFFF"/>
+                </a:solidFill>
+              </a14:hiddenFill>
+            </a:ext>
+          </a:extLst>
+        </p:spPr>
+      </p:pic>
+      <p:pic>
+        <p:nvPicPr>
+          <p:cNvPr id="2051" name="Picture 2" descr="check">
+            <a:extLst>
+              <a:ext uri="{FF2B5EF4-FFF2-40B4-BE49-F238E27FC236}">
+                <a16:creationId xmlns:a16="http://schemas.microsoft.com/office/drawing/2014/main" id="{78300109-7A83-4484-8401-B9245A233358}"/>
+              </a:ext>
+            </a:extLst>
+          </p:cNvPr>
+          <p:cNvPicPr>
+            <a:picLocks noChangeAspect="1" noChangeArrowheads="1"/>
+          </p:cNvPicPr>
+          <p:nvPr/>
+        </p:nvPicPr>
+        <p:blipFill>
+          <a:blip r:embed="rId4">
+            <a:extLst>
+              <a:ext uri="{28A0092B-C50C-407E-A947-70E740481C1C}">
+                <a14:useLocalDpi xmlns:a14="http://schemas.microsoft.com/office/drawing/2010/main" val="0"/>
+              </a:ext>
+            </a:extLst>
+          </a:blip>
+          <a:srcRect/>
+          <a:stretch>
+            <a:fillRect/>
+          </a:stretch>
+        </p:blipFill>
+        <p:spPr bwMode="auto">
+          <a:xfrm>
+            <a:off x="0" y="0"/>
+            <a:ext cx="133350" cy="133350"/>
+          </a:xfrm>
+          <a:prstGeom prst="rect">
+            <a:avLst/>
+          </a:prstGeom>
+          <a:noFill/>
+          <a:extLst>
+            <a:ext uri="{909E8E84-426E-40DD-AFC4-6F175D3DCCD1}">
+              <a14:hiddenFill xmlns:a14="http://schemas.microsoft.com/office/drawing/2010/main">
+                <a:solidFill>
+                  <a:srgbClr val="FFFFFF"/>
+                </a:solidFill>
+              </a14:hiddenFill>
+            </a:ext>
+          </a:extLst>
+        </p:spPr>
+      </p:pic>
+    </p:spTree>
+    <p:extLst>
+      <p:ext uri="{BB962C8B-B14F-4D97-AF65-F5344CB8AC3E}">
+        <p14:creationId xmlns:p14="http://schemas.microsoft.com/office/powerpoint/2010/main" val="4292049979"/>
+      </p:ext>
+    </p:extLst>
+  </p:cSld>
+  <p:clrMapOvr>
+    <a:masterClrMapping/>
+  </p:clrMapOvr>
+</p:sld>
+</file>
+
+<file path=ppt/slides/slide19.xml><?xml version="1.0" encoding="utf-8"?>
 <p:sld xmlns:a="http://schemas.openxmlformats.org/drawingml/2006/main" xmlns:r="http://schemas.openxmlformats.org/officeDocument/2006/relationships" xmlns:p="http://schemas.openxmlformats.org/presentationml/2006/main">
   <p:cSld>
     <p:bg>
@@ -6043,6 +9397,100 @@
           </a:p>
         </p:txBody>
       </p:sp>
+      <p:pic>
+        <p:nvPicPr>
+          <p:cNvPr id="1025" name="Picture 1" descr="Incorrect">
+            <a:extLst>
+              <a:ext uri="{FF2B5EF4-FFF2-40B4-BE49-F238E27FC236}">
+                <a16:creationId xmlns:a16="http://schemas.microsoft.com/office/drawing/2014/main" id="{97E372C0-79EA-4163-AF05-6F085D956013}"/>
+              </a:ext>
+            </a:extLst>
+          </p:cNvPr>
+          <p:cNvPicPr>
+            <a:picLocks noChangeAspect="1" noChangeArrowheads="1"/>
+          </p:cNvPicPr>
+          <p:nvPr/>
+        </p:nvPicPr>
+        <p:blipFill>
+          <a:blip r:embed="rId3">
+            <a:extLst>
+              <a:ext uri="{28A0092B-C50C-407E-A947-70E740481C1C}">
+                <a14:useLocalDpi xmlns:a14="http://schemas.microsoft.com/office/drawing/2010/main" val="0"/>
+              </a:ext>
+            </a:extLst>
+          </a:blip>
+          <a:srcRect/>
+          <a:stretch>
+            <a:fillRect/>
+          </a:stretch>
+        </p:blipFill>
+        <p:spPr bwMode="auto">
+          <a:xfrm>
+            <a:off x="0" y="0"/>
+            <a:ext cx="133350" cy="133350"/>
+          </a:xfrm>
+          <a:prstGeom prst="rect">
+            <a:avLst/>
+          </a:prstGeom>
+          <a:noFill/>
+          <a:extLst>
+            <a:ext uri="{909E8E84-426E-40DD-AFC4-6F175D3DCCD1}">
+              <a14:hiddenFill xmlns:a14="http://schemas.microsoft.com/office/drawing/2010/main">
+                <a:solidFill>
+                  <a:srgbClr val="FFFFFF"/>
+                </a:solidFill>
+              </a14:hiddenFill>
+            </a:ext>
+          </a:extLst>
+        </p:spPr>
+      </p:pic>
+      <p:pic>
+        <p:nvPicPr>
+          <p:cNvPr id="1026" name="Picture 2" descr="check">
+            <a:extLst>
+              <a:ext uri="{FF2B5EF4-FFF2-40B4-BE49-F238E27FC236}">
+                <a16:creationId xmlns:a16="http://schemas.microsoft.com/office/drawing/2014/main" id="{FF630134-2A3E-4B1F-B885-E4167E19C0A8}"/>
+              </a:ext>
+            </a:extLst>
+          </p:cNvPr>
+          <p:cNvPicPr>
+            <a:picLocks noChangeAspect="1" noChangeArrowheads="1"/>
+          </p:cNvPicPr>
+          <p:nvPr/>
+        </p:nvPicPr>
+        <p:blipFill>
+          <a:blip r:embed="rId4">
+            <a:extLst>
+              <a:ext uri="{28A0092B-C50C-407E-A947-70E740481C1C}">
+                <a14:useLocalDpi xmlns:a14="http://schemas.microsoft.com/office/drawing/2010/main" val="0"/>
+              </a:ext>
+            </a:extLst>
+          </a:blip>
+          <a:srcRect/>
+          <a:stretch>
+            <a:fillRect/>
+          </a:stretch>
+        </p:blipFill>
+        <p:spPr bwMode="auto">
+          <a:xfrm>
+            <a:off x="0" y="0"/>
+            <a:ext cx="133350" cy="133350"/>
+          </a:xfrm>
+          <a:prstGeom prst="rect">
+            <a:avLst/>
+          </a:prstGeom>
+          <a:noFill/>
+          <a:extLst>
+            <a:ext uri="{909E8E84-426E-40DD-AFC4-6F175D3DCCD1}">
+              <a14:hiddenFill xmlns:a14="http://schemas.microsoft.com/office/drawing/2010/main">
+                <a:solidFill>
+                  <a:srgbClr val="FFFFFF"/>
+                </a:solidFill>
+              </a14:hiddenFill>
+            </a:ext>
+          </a:extLst>
+        </p:spPr>
+      </p:pic>
     </p:spTree>
     <p:extLst>
       <p:ext uri="{BB962C8B-B14F-4D97-AF65-F5344CB8AC3E}">
@@ -6185,6 +9633,100 @@
           </a:p>
         </p:txBody>
       </p:sp>
+      <p:pic>
+        <p:nvPicPr>
+          <p:cNvPr id="2050" name="Picture 1" descr="Incorrect">
+            <a:extLst>
+              <a:ext uri="{FF2B5EF4-FFF2-40B4-BE49-F238E27FC236}">
+                <a16:creationId xmlns:a16="http://schemas.microsoft.com/office/drawing/2014/main" id="{FF58184F-9DBB-46F2-9AD1-5DD64E112630}"/>
+              </a:ext>
+            </a:extLst>
+          </p:cNvPr>
+          <p:cNvPicPr>
+            <a:picLocks noChangeAspect="1" noChangeArrowheads="1"/>
+          </p:cNvPicPr>
+          <p:nvPr/>
+        </p:nvPicPr>
+        <p:blipFill>
+          <a:blip r:embed="rId3">
+            <a:extLst>
+              <a:ext uri="{28A0092B-C50C-407E-A947-70E740481C1C}">
+                <a14:useLocalDpi xmlns:a14="http://schemas.microsoft.com/office/drawing/2010/main" val="0"/>
+              </a:ext>
+            </a:extLst>
+          </a:blip>
+          <a:srcRect/>
+          <a:stretch>
+            <a:fillRect/>
+          </a:stretch>
+        </p:blipFill>
+        <p:spPr bwMode="auto">
+          <a:xfrm>
+            <a:off x="0" y="0"/>
+            <a:ext cx="133350" cy="133350"/>
+          </a:xfrm>
+          <a:prstGeom prst="rect">
+            <a:avLst/>
+          </a:prstGeom>
+          <a:noFill/>
+          <a:extLst>
+            <a:ext uri="{909E8E84-426E-40DD-AFC4-6F175D3DCCD1}">
+              <a14:hiddenFill xmlns:a14="http://schemas.microsoft.com/office/drawing/2010/main">
+                <a:solidFill>
+                  <a:srgbClr val="FFFFFF"/>
+                </a:solidFill>
+              </a14:hiddenFill>
+            </a:ext>
+          </a:extLst>
+        </p:spPr>
+      </p:pic>
+      <p:pic>
+        <p:nvPicPr>
+          <p:cNvPr id="2051" name="Picture 2" descr="check">
+            <a:extLst>
+              <a:ext uri="{FF2B5EF4-FFF2-40B4-BE49-F238E27FC236}">
+                <a16:creationId xmlns:a16="http://schemas.microsoft.com/office/drawing/2014/main" id="{78300109-7A83-4484-8401-B9245A233358}"/>
+              </a:ext>
+            </a:extLst>
+          </p:cNvPr>
+          <p:cNvPicPr>
+            <a:picLocks noChangeAspect="1" noChangeArrowheads="1"/>
+          </p:cNvPicPr>
+          <p:nvPr/>
+        </p:nvPicPr>
+        <p:blipFill>
+          <a:blip r:embed="rId4">
+            <a:extLst>
+              <a:ext uri="{28A0092B-C50C-407E-A947-70E740481C1C}">
+                <a14:useLocalDpi xmlns:a14="http://schemas.microsoft.com/office/drawing/2010/main" val="0"/>
+              </a:ext>
+            </a:extLst>
+          </a:blip>
+          <a:srcRect/>
+          <a:stretch>
+            <a:fillRect/>
+          </a:stretch>
+        </p:blipFill>
+        <p:spPr bwMode="auto">
+          <a:xfrm>
+            <a:off x="0" y="0"/>
+            <a:ext cx="133350" cy="133350"/>
+          </a:xfrm>
+          <a:prstGeom prst="rect">
+            <a:avLst/>
+          </a:prstGeom>
+          <a:noFill/>
+          <a:extLst>
+            <a:ext uri="{909E8E84-426E-40DD-AFC4-6F175D3DCCD1}">
+              <a14:hiddenFill xmlns:a14="http://schemas.microsoft.com/office/drawing/2010/main">
+                <a:solidFill>
+                  <a:srgbClr val="FFFFFF"/>
+                </a:solidFill>
+              </a14:hiddenFill>
+            </a:ext>
+          </a:extLst>
+        </p:spPr>
+      </p:pic>
     </p:spTree>
     <p:extLst>
       <p:ext uri="{BB962C8B-B14F-4D97-AF65-F5344CB8AC3E}">

</xml_diff>